<commit_message>
update flowchart and presentation
</commit_message>
<xml_diff>
--- a/Printer-Queue.pptx
+++ b/Printer-Queue.pptx
@@ -8,6 +8,8 @@
     <p:sldId id="256" r:id="rId2"/>
     <p:sldId id="257" r:id="rId3"/>
     <p:sldId id="258" r:id="rId4"/>
+    <p:sldId id="259" r:id="rId5"/>
+    <p:sldId id="260" r:id="rId6"/>
   </p:sldIdLst>
   <p:sldSz cx="12192000" cy="6858000"/>
   <p:notesSz cx="6858000" cy="9144000"/>
@@ -3364,7 +3366,7 @@
           <a:p>
             <a:fld id="{DC921396-ADFF-4FFE-B2B9-4B7A5F99A2D9}" type="datetimeFigureOut">
               <a:rPr lang="ko-KR" altLang="en-US" smtClean="0"/>
-              <a:t>2021-03-01(Mon)</a:t>
+              <a:t>2021-03-03(Wed)</a:t>
             </a:fld>
             <a:endParaRPr lang="ko-KR" altLang="en-US"/>
           </a:p>
@@ -3562,7 +3564,7 @@
           <a:p>
             <a:fld id="{DC921396-ADFF-4FFE-B2B9-4B7A5F99A2D9}" type="datetimeFigureOut">
               <a:rPr lang="ko-KR" altLang="en-US" smtClean="0"/>
-              <a:t>2021-03-01(Mon)</a:t>
+              <a:t>2021-03-03(Wed)</a:t>
             </a:fld>
             <a:endParaRPr lang="ko-KR" altLang="en-US"/>
           </a:p>
@@ -3770,7 +3772,7 @@
           <a:p>
             <a:fld id="{DC921396-ADFF-4FFE-B2B9-4B7A5F99A2D9}" type="datetimeFigureOut">
               <a:rPr lang="ko-KR" altLang="en-US" smtClean="0"/>
-              <a:t>2021-03-01(Mon)</a:t>
+              <a:t>2021-03-03(Wed)</a:t>
             </a:fld>
             <a:endParaRPr lang="ko-KR" altLang="en-US"/>
           </a:p>
@@ -3968,7 +3970,7 @@
           <a:p>
             <a:fld id="{DC921396-ADFF-4FFE-B2B9-4B7A5F99A2D9}" type="datetimeFigureOut">
               <a:rPr lang="ko-KR" altLang="en-US" smtClean="0"/>
-              <a:t>2021-03-01(Mon)</a:t>
+              <a:t>2021-03-03(Wed)</a:t>
             </a:fld>
             <a:endParaRPr lang="ko-KR" altLang="en-US"/>
           </a:p>
@@ -4243,7 +4245,7 @@
           <a:p>
             <a:fld id="{DC921396-ADFF-4FFE-B2B9-4B7A5F99A2D9}" type="datetimeFigureOut">
               <a:rPr lang="ko-KR" altLang="en-US" smtClean="0"/>
-              <a:t>2021-03-01(Mon)</a:t>
+              <a:t>2021-03-03(Wed)</a:t>
             </a:fld>
             <a:endParaRPr lang="ko-KR" altLang="en-US"/>
           </a:p>
@@ -4508,7 +4510,7 @@
           <a:p>
             <a:fld id="{DC921396-ADFF-4FFE-B2B9-4B7A5F99A2D9}" type="datetimeFigureOut">
               <a:rPr lang="ko-KR" altLang="en-US" smtClean="0"/>
-              <a:t>2021-03-01(Mon)</a:t>
+              <a:t>2021-03-03(Wed)</a:t>
             </a:fld>
             <a:endParaRPr lang="ko-KR" altLang="en-US"/>
           </a:p>
@@ -4920,7 +4922,7 @@
           <a:p>
             <a:fld id="{DC921396-ADFF-4FFE-B2B9-4B7A5F99A2D9}" type="datetimeFigureOut">
               <a:rPr lang="ko-KR" altLang="en-US" smtClean="0"/>
-              <a:t>2021-03-01(Mon)</a:t>
+              <a:t>2021-03-03(Wed)</a:t>
             </a:fld>
             <a:endParaRPr lang="ko-KR" altLang="en-US"/>
           </a:p>
@@ -5061,7 +5063,7 @@
           <a:p>
             <a:fld id="{DC921396-ADFF-4FFE-B2B9-4B7A5F99A2D9}" type="datetimeFigureOut">
               <a:rPr lang="ko-KR" altLang="en-US" smtClean="0"/>
-              <a:t>2021-03-01(Mon)</a:t>
+              <a:t>2021-03-03(Wed)</a:t>
             </a:fld>
             <a:endParaRPr lang="ko-KR" altLang="en-US"/>
           </a:p>
@@ -5174,7 +5176,7 @@
           <a:p>
             <a:fld id="{DC921396-ADFF-4FFE-B2B9-4B7A5F99A2D9}" type="datetimeFigureOut">
               <a:rPr lang="ko-KR" altLang="en-US" smtClean="0"/>
-              <a:t>2021-03-01(Mon)</a:t>
+              <a:t>2021-03-03(Wed)</a:t>
             </a:fld>
             <a:endParaRPr lang="ko-KR" altLang="en-US"/>
           </a:p>
@@ -5485,7 +5487,7 @@
           <a:p>
             <a:fld id="{DC921396-ADFF-4FFE-B2B9-4B7A5F99A2D9}" type="datetimeFigureOut">
               <a:rPr lang="ko-KR" altLang="en-US" smtClean="0"/>
-              <a:t>2021-03-01(Mon)</a:t>
+              <a:t>2021-03-03(Wed)</a:t>
             </a:fld>
             <a:endParaRPr lang="ko-KR" altLang="en-US"/>
           </a:p>
@@ -5773,7 +5775,7 @@
           <a:p>
             <a:fld id="{DC921396-ADFF-4FFE-B2B9-4B7A5F99A2D9}" type="datetimeFigureOut">
               <a:rPr lang="ko-KR" altLang="en-US" smtClean="0"/>
-              <a:t>2021-03-01(Mon)</a:t>
+              <a:t>2021-03-03(Wed)</a:t>
             </a:fld>
             <a:endParaRPr lang="ko-KR" altLang="en-US"/>
           </a:p>
@@ -6014,7 +6016,7 @@
           <a:p>
             <a:fld id="{DC921396-ADFF-4FFE-B2B9-4B7A5F99A2D9}" type="datetimeFigureOut">
               <a:rPr lang="ko-KR" altLang="en-US" smtClean="0"/>
-              <a:t>2021-03-01(Mon)</a:t>
+              <a:t>2021-03-03(Wed)</a:t>
             </a:fld>
             <a:endParaRPr lang="ko-KR" altLang="en-US"/>
           </a:p>
@@ -6433,10 +6435,10 @@
       </p:grpSpPr>
       <p:pic>
         <p:nvPicPr>
-          <p:cNvPr id="7" name="그림 6" descr="텍스트, 명함이(가) 표시된 사진&#10;&#10;자동 생성된 설명">
+          <p:cNvPr id="5" name="그림 4">
             <a:extLst>
               <a:ext uri="{FF2B5EF4-FFF2-40B4-BE49-F238E27FC236}">
-                <a16:creationId xmlns:a16="http://schemas.microsoft.com/office/drawing/2014/main" id="{7A53E971-68CA-4FA1-9A00-564F619CAF13}"/>
+                <a16:creationId xmlns:a16="http://schemas.microsoft.com/office/drawing/2014/main" id="{1A6B066B-A4AE-40ED-A965-ABCE9FDAB38F}"/>
               </a:ext>
             </a:extLst>
           </p:cNvPr>
@@ -6459,8 +6461,8 @@
         </p:blipFill>
         <p:spPr>
           <a:xfrm>
-            <a:off x="2842284" y="0"/>
-            <a:ext cx="6507431" cy="6858000"/>
+            <a:off x="2842098" y="0"/>
+            <a:ext cx="6507804" cy="6858000"/>
           </a:xfrm>
           <a:prstGeom prst="rect">
             <a:avLst/>
@@ -6570,7 +6572,7 @@
           <p:nvPr>
             <p:extLst>
               <p:ext uri="{D42A27DB-BD31-4B8C-83A1-F6EECF244321}">
-                <p14:modId xmlns:p14="http://schemas.microsoft.com/office/powerpoint/2010/main" val="2862551562"/>
+                <p14:modId xmlns:p14="http://schemas.microsoft.com/office/powerpoint/2010/main" val="135937662"/>
               </p:ext>
             </p:extLst>
           </p:nvPr>
@@ -6766,10 +6768,2869 @@
           </a:graphicData>
         </a:graphic>
       </p:graphicFrame>
+      <p:sp>
+        <p:nvSpPr>
+          <p:cNvPr id="3" name="TextBox 2">
+            <a:extLst>
+              <a:ext uri="{FF2B5EF4-FFF2-40B4-BE49-F238E27FC236}">
+                <a16:creationId xmlns:a16="http://schemas.microsoft.com/office/drawing/2014/main" id="{89D2B415-689D-4138-B75E-3BC0ED41AD59}"/>
+              </a:ext>
+            </a:extLst>
+          </p:cNvPr>
+          <p:cNvSpPr txBox="1"/>
+          <p:nvPr/>
+        </p:nvSpPr>
+        <p:spPr>
+          <a:xfrm>
+            <a:off x="642257" y="463035"/>
+            <a:ext cx="3494314" cy="830997"/>
+          </a:xfrm>
+          <a:prstGeom prst="rect">
+            <a:avLst/>
+          </a:prstGeom>
+          <a:noFill/>
+        </p:spPr>
+        <p:txBody>
+          <a:bodyPr wrap="square" rtlCol="0">
+            <a:spAutoFit/>
+          </a:bodyPr>
+          <a:lstStyle/>
+          <a:p>
+            <a:r>
+              <a:rPr lang="en-US" altLang="ko-KR" sz="2400" dirty="0">
+                <a:latin typeface="a고딕12" panose="02020600000000000000" pitchFamily="18" charset="-127"/>
+                <a:ea typeface="a고딕12" panose="02020600000000000000" pitchFamily="18" charset="-127"/>
+              </a:rPr>
+              <a:t>count = 0</a:t>
+            </a:r>
+          </a:p>
+          <a:p>
+            <a:r>
+              <a:rPr lang="en-US" altLang="ko-KR" sz="2400" dirty="0" err="1">
+                <a:latin typeface="a고딕12" panose="02020600000000000000" pitchFamily="18" charset="-127"/>
+                <a:ea typeface="a고딕12" panose="02020600000000000000" pitchFamily="18" charset="-127"/>
+              </a:rPr>
+              <a:t>maxValue</a:t>
+            </a:r>
+            <a:r>
+              <a:rPr lang="en-US" altLang="ko-KR" sz="2400" dirty="0">
+                <a:latin typeface="a고딕12" panose="02020600000000000000" pitchFamily="18" charset="-127"/>
+                <a:ea typeface="a고딕12" panose="02020600000000000000" pitchFamily="18" charset="-127"/>
+              </a:rPr>
+              <a:t> = 9</a:t>
+            </a:r>
+            <a:endParaRPr lang="ko-KR" altLang="en-US" sz="2400" dirty="0">
+              <a:latin typeface="a고딕12" panose="02020600000000000000" pitchFamily="18" charset="-127"/>
+              <a:ea typeface="a고딕12" panose="02020600000000000000" pitchFamily="18" charset="-127"/>
+            </a:endParaRPr>
+          </a:p>
+        </p:txBody>
+      </p:sp>
+      <p:grpSp>
+        <p:nvGrpSpPr>
+          <p:cNvPr id="6" name="그룹 5">
+            <a:extLst>
+              <a:ext uri="{FF2B5EF4-FFF2-40B4-BE49-F238E27FC236}">
+                <a16:creationId xmlns:a16="http://schemas.microsoft.com/office/drawing/2014/main" id="{0395B560-9A4F-4BE1-B7A4-76FD638FCACD}"/>
+              </a:ext>
+            </a:extLst>
+          </p:cNvPr>
+          <p:cNvGrpSpPr/>
+          <p:nvPr/>
+        </p:nvGrpSpPr>
+        <p:grpSpPr>
+          <a:xfrm>
+            <a:off x="375557" y="4234542"/>
+            <a:ext cx="1611086" cy="1713522"/>
+            <a:chOff x="342900" y="4452257"/>
+            <a:chExt cx="1611086" cy="1713522"/>
+          </a:xfrm>
+        </p:grpSpPr>
+        <p:sp>
+          <p:nvSpPr>
+            <p:cNvPr id="2" name="화살표: 위쪽 1">
+              <a:extLst>
+                <a:ext uri="{FF2B5EF4-FFF2-40B4-BE49-F238E27FC236}">
+                  <a16:creationId xmlns:a16="http://schemas.microsoft.com/office/drawing/2014/main" id="{9C2EC515-FBC7-4899-8AF0-AB5CAF3461EC}"/>
+                </a:ext>
+              </a:extLst>
+            </p:cNvPr>
+            <p:cNvSpPr/>
+            <p:nvPr/>
+          </p:nvSpPr>
+          <p:spPr>
+            <a:xfrm>
+              <a:off x="642257" y="4452257"/>
+              <a:ext cx="1012372" cy="1251857"/>
+            </a:xfrm>
+            <a:prstGeom prst="upArrow">
+              <a:avLst/>
+            </a:prstGeom>
+          </p:spPr>
+          <p:style>
+            <a:lnRef idx="2">
+              <a:schemeClr val="accent1">
+                <a:shade val="50000"/>
+              </a:schemeClr>
+            </a:lnRef>
+            <a:fillRef idx="1">
+              <a:schemeClr val="accent1"/>
+            </a:fillRef>
+            <a:effectRef idx="0">
+              <a:schemeClr val="accent1"/>
+            </a:effectRef>
+            <a:fontRef idx="minor">
+              <a:schemeClr val="lt1"/>
+            </a:fontRef>
+          </p:style>
+          <p:txBody>
+            <a:bodyPr rtlCol="0" anchor="ctr"/>
+            <a:lstStyle/>
+            <a:p>
+              <a:pPr algn="ctr"/>
+              <a:endParaRPr lang="ko-KR" altLang="en-US" sz="2400">
+                <a:latin typeface="a고딕12" panose="02020600000000000000" pitchFamily="18" charset="-127"/>
+                <a:ea typeface="a고딕12" panose="02020600000000000000" pitchFamily="18" charset="-127"/>
+              </a:endParaRPr>
+            </a:p>
+          </p:txBody>
+        </p:sp>
+        <p:sp>
+          <p:nvSpPr>
+            <p:cNvPr id="5" name="TextBox 4">
+              <a:extLst>
+                <a:ext uri="{FF2B5EF4-FFF2-40B4-BE49-F238E27FC236}">
+                  <a16:creationId xmlns:a16="http://schemas.microsoft.com/office/drawing/2014/main" id="{ABC0A7EA-1729-458E-B0B0-BD64C1D98E98}"/>
+                </a:ext>
+              </a:extLst>
+            </p:cNvPr>
+            <p:cNvSpPr txBox="1"/>
+            <p:nvPr/>
+          </p:nvSpPr>
+          <p:spPr>
+            <a:xfrm>
+              <a:off x="342900" y="5704114"/>
+              <a:ext cx="1611086" cy="461665"/>
+            </a:xfrm>
+            <a:prstGeom prst="rect">
+              <a:avLst/>
+            </a:prstGeom>
+            <a:noFill/>
+          </p:spPr>
+          <p:txBody>
+            <a:bodyPr wrap="square" rtlCol="0">
+              <a:spAutoFit/>
+            </a:bodyPr>
+            <a:lstStyle/>
+            <a:p>
+              <a:pPr algn="ctr"/>
+              <a:r>
+                <a:rPr lang="en-US" altLang="ko-KR" sz="2400" dirty="0">
+                  <a:latin typeface="a고딕12" panose="02020600000000000000" pitchFamily="18" charset="-127"/>
+                  <a:ea typeface="a고딕12" panose="02020600000000000000" pitchFamily="18" charset="-127"/>
+                </a:rPr>
+                <a:t>index</a:t>
+              </a:r>
+              <a:endParaRPr lang="ko-KR" altLang="en-US" sz="2400" dirty="0">
+                <a:latin typeface="a고딕12" panose="02020600000000000000" pitchFamily="18" charset="-127"/>
+                <a:ea typeface="a고딕12" panose="02020600000000000000" pitchFamily="18" charset="-127"/>
+              </a:endParaRPr>
+            </a:p>
+          </p:txBody>
+        </p:sp>
+      </p:grpSp>
+      <p:graphicFrame>
+        <p:nvGraphicFramePr>
+          <p:cNvPr id="7" name="표 4">
+            <a:extLst>
+              <a:ext uri="{FF2B5EF4-FFF2-40B4-BE49-F238E27FC236}">
+                <a16:creationId xmlns:a16="http://schemas.microsoft.com/office/drawing/2014/main" id="{2E07E9C8-AC1A-4A31-8A07-4E5644E60DDB}"/>
+              </a:ext>
+            </a:extLst>
+          </p:cNvPr>
+          <p:cNvGraphicFramePr>
+            <a:graphicFrameLocks noGrp="1"/>
+          </p:cNvGraphicFramePr>
+          <p:nvPr>
+            <p:extLst>
+              <p:ext uri="{D42A27DB-BD31-4B8C-83A1-F6EECF244321}">
+                <p14:modId xmlns:p14="http://schemas.microsoft.com/office/powerpoint/2010/main" val="2274100406"/>
+              </p:ext>
+            </p:extLst>
+          </p:nvPr>
+        </p:nvGraphicFramePr>
+        <p:xfrm>
+          <a:off x="250370" y="1937657"/>
+          <a:ext cx="9697360" cy="2024743"/>
+        </p:xfrm>
+        <a:graphic>
+          <a:graphicData uri="http://schemas.openxmlformats.org/drawingml/2006/table">
+            <a:tbl>
+              <a:tblPr firstRow="1" bandRow="1">
+                <a:tableStyleId>{5C22544A-7EE6-4342-B048-85BDC9FD1C3A}</a:tableStyleId>
+              </a:tblPr>
+              <a:tblGrid>
+                <a:gridCol w="1939472">
+                  <a:extLst>
+                    <a:ext uri="{9D8B030D-6E8A-4147-A177-3AD203B41FA5}">
+                      <a16:colId xmlns:a16="http://schemas.microsoft.com/office/drawing/2014/main" val="1653098086"/>
+                    </a:ext>
+                  </a:extLst>
+                </a:gridCol>
+                <a:gridCol w="1939472">
+                  <a:extLst>
+                    <a:ext uri="{9D8B030D-6E8A-4147-A177-3AD203B41FA5}">
+                      <a16:colId xmlns:a16="http://schemas.microsoft.com/office/drawing/2014/main" val="4009950614"/>
+                    </a:ext>
+                  </a:extLst>
+                </a:gridCol>
+                <a:gridCol w="1939472">
+                  <a:extLst>
+                    <a:ext uri="{9D8B030D-6E8A-4147-A177-3AD203B41FA5}">
+                      <a16:colId xmlns:a16="http://schemas.microsoft.com/office/drawing/2014/main" val="1955210884"/>
+                    </a:ext>
+                  </a:extLst>
+                </a:gridCol>
+                <a:gridCol w="1939472">
+                  <a:extLst>
+                    <a:ext uri="{9D8B030D-6E8A-4147-A177-3AD203B41FA5}">
+                      <a16:colId xmlns:a16="http://schemas.microsoft.com/office/drawing/2014/main" val="1897946193"/>
+                    </a:ext>
+                  </a:extLst>
+                </a:gridCol>
+                <a:gridCol w="1939472">
+                  <a:extLst>
+                    <a:ext uri="{9D8B030D-6E8A-4147-A177-3AD203B41FA5}">
+                      <a16:colId xmlns:a16="http://schemas.microsoft.com/office/drawing/2014/main" val="2706033229"/>
+                    </a:ext>
+                  </a:extLst>
+                </a:gridCol>
+              </a:tblGrid>
+              <a:tr h="2024743">
+                <a:tc>
+                  <a:txBody>
+                    <a:bodyPr/>
+                    <a:lstStyle/>
+                    <a:p>
+                      <a:pPr algn="ctr" latinLnBrk="1"/>
+                      <a:r>
+                        <a:rPr lang="en-US" altLang="ko-KR" sz="7000" dirty="0">
+                          <a:latin typeface="a고딕14" panose="02020600000000000000" pitchFamily="18" charset="-127"/>
+                          <a:ea typeface="a고딕14" panose="02020600000000000000" pitchFamily="18" charset="-127"/>
+                        </a:rPr>
+                        <a:t>1</a:t>
+                      </a:r>
+                      <a:endParaRPr lang="ko-KR" altLang="en-US" sz="7000" dirty="0">
+                        <a:latin typeface="a고딕14" panose="02020600000000000000" pitchFamily="18" charset="-127"/>
+                        <a:ea typeface="a고딕14" panose="02020600000000000000" pitchFamily="18" charset="-127"/>
+                      </a:endParaRPr>
+                    </a:p>
+                  </a:txBody>
+                  <a:tcPr anchor="ctr"/>
+                </a:tc>
+                <a:tc>
+                  <a:txBody>
+                    <a:bodyPr/>
+                    <a:lstStyle/>
+                    <a:p>
+                      <a:pPr algn="ctr" latinLnBrk="1"/>
+                      <a:r>
+                        <a:rPr lang="en-US" altLang="ko-KR" sz="7000" dirty="0">
+                          <a:latin typeface="a고딕14" panose="02020600000000000000" pitchFamily="18" charset="-127"/>
+                          <a:ea typeface="a고딕14" panose="02020600000000000000" pitchFamily="18" charset="-127"/>
+                        </a:rPr>
+                        <a:t>1</a:t>
+                      </a:r>
+                      <a:endParaRPr lang="ko-KR" altLang="en-US" sz="7000" dirty="0">
+                        <a:latin typeface="a고딕14" panose="02020600000000000000" pitchFamily="18" charset="-127"/>
+                        <a:ea typeface="a고딕14" panose="02020600000000000000" pitchFamily="18" charset="-127"/>
+                      </a:endParaRPr>
+                    </a:p>
+                  </a:txBody>
+                  <a:tcPr anchor="ctr"/>
+                </a:tc>
+                <a:tc>
+                  <a:txBody>
+                    <a:bodyPr/>
+                    <a:lstStyle/>
+                    <a:p>
+                      <a:pPr algn="ctr" latinLnBrk="1"/>
+                      <a:r>
+                        <a:rPr lang="en-US" altLang="ko-KR" sz="7000" dirty="0">
+                          <a:latin typeface="a고딕14" panose="02020600000000000000" pitchFamily="18" charset="-127"/>
+                          <a:ea typeface="a고딕14" panose="02020600000000000000" pitchFamily="18" charset="-127"/>
+                        </a:rPr>
+                        <a:t>1</a:t>
+                      </a:r>
+                      <a:endParaRPr lang="ko-KR" altLang="en-US" sz="7000" dirty="0">
+                        <a:latin typeface="a고딕14" panose="02020600000000000000" pitchFamily="18" charset="-127"/>
+                        <a:ea typeface="a고딕14" panose="02020600000000000000" pitchFamily="18" charset="-127"/>
+                      </a:endParaRPr>
+                    </a:p>
+                  </a:txBody>
+                  <a:tcPr anchor="ctr"/>
+                </a:tc>
+                <a:tc>
+                  <a:txBody>
+                    <a:bodyPr/>
+                    <a:lstStyle/>
+                    <a:p>
+                      <a:pPr algn="ctr" latinLnBrk="1"/>
+                      <a:r>
+                        <a:rPr lang="en-US" altLang="ko-KR" sz="7000" dirty="0">
+                          <a:latin typeface="a고딕14" panose="02020600000000000000" pitchFamily="18" charset="-127"/>
+                          <a:ea typeface="a고딕14" panose="02020600000000000000" pitchFamily="18" charset="-127"/>
+                        </a:rPr>
+                        <a:t>1</a:t>
+                      </a:r>
+                      <a:endParaRPr lang="ko-KR" altLang="en-US" sz="7000" dirty="0">
+                        <a:latin typeface="a고딕14" panose="02020600000000000000" pitchFamily="18" charset="-127"/>
+                        <a:ea typeface="a고딕14" panose="02020600000000000000" pitchFamily="18" charset="-127"/>
+                      </a:endParaRPr>
+                    </a:p>
+                  </a:txBody>
+                  <a:tcPr anchor="ctr"/>
+                </a:tc>
+                <a:tc>
+                  <a:txBody>
+                    <a:bodyPr/>
+                    <a:lstStyle/>
+                    <a:p>
+                      <a:pPr algn="ctr" latinLnBrk="1"/>
+                      <a:r>
+                        <a:rPr lang="en-US" altLang="ko-KR" sz="7000" dirty="0">
+                          <a:latin typeface="a고딕14" panose="02020600000000000000" pitchFamily="18" charset="-127"/>
+                          <a:ea typeface="a고딕14" panose="02020600000000000000" pitchFamily="18" charset="-127"/>
+                        </a:rPr>
+                        <a:t>1</a:t>
+                      </a:r>
+                      <a:endParaRPr lang="ko-KR" altLang="en-US" sz="7000" dirty="0">
+                        <a:latin typeface="a고딕14" panose="02020600000000000000" pitchFamily="18" charset="-127"/>
+                        <a:ea typeface="a고딕14" panose="02020600000000000000" pitchFamily="18" charset="-127"/>
+                      </a:endParaRPr>
+                    </a:p>
+                  </a:txBody>
+                  <a:tcPr anchor="ctr"/>
+                </a:tc>
+                <a:extLst>
+                  <a:ext uri="{0D108BD9-81ED-4DB2-BD59-A6C34878D82A}">
+                    <a16:rowId xmlns:a16="http://schemas.microsoft.com/office/drawing/2014/main" val="3503805624"/>
+                  </a:ext>
+                </a:extLst>
+              </a:tr>
+            </a:tbl>
+          </a:graphicData>
+        </a:graphic>
+      </p:graphicFrame>
+      <p:sp>
+        <p:nvSpPr>
+          <p:cNvPr id="8" name="타원 7">
+            <a:extLst>
+              <a:ext uri="{FF2B5EF4-FFF2-40B4-BE49-F238E27FC236}">
+                <a16:creationId xmlns:a16="http://schemas.microsoft.com/office/drawing/2014/main" id="{06E9DA9E-F260-4C49-B5D9-415043EF344C}"/>
+              </a:ext>
+            </a:extLst>
+          </p:cNvPr>
+          <p:cNvSpPr/>
+          <p:nvPr/>
+        </p:nvSpPr>
+        <p:spPr>
+          <a:xfrm>
+            <a:off x="4109357" y="1937657"/>
+            <a:ext cx="1959429" cy="1959429"/>
+          </a:xfrm>
+          <a:prstGeom prst="ellipse">
+            <a:avLst/>
+          </a:prstGeom>
+          <a:noFill/>
+          <a:ln w="22225">
+            <a:solidFill>
+              <a:srgbClr val="FF0000"/>
+            </a:solidFill>
+          </a:ln>
+        </p:spPr>
+        <p:style>
+          <a:lnRef idx="2">
+            <a:schemeClr val="accent1">
+              <a:shade val="50000"/>
+            </a:schemeClr>
+          </a:lnRef>
+          <a:fillRef idx="1">
+            <a:schemeClr val="accent1"/>
+          </a:fillRef>
+          <a:effectRef idx="0">
+            <a:schemeClr val="accent1"/>
+          </a:effectRef>
+          <a:fontRef idx="minor">
+            <a:schemeClr val="lt1"/>
+          </a:fontRef>
+        </p:style>
+        <p:txBody>
+          <a:bodyPr rtlCol="0" anchor="ctr"/>
+          <a:lstStyle/>
+          <a:p>
+            <a:pPr algn="ctr"/>
+            <a:endParaRPr lang="ko-KR" altLang="en-US" sz="2400" dirty="0">
+              <a:latin typeface="a고딕12" panose="02020600000000000000" pitchFamily="18" charset="-127"/>
+              <a:ea typeface="a고딕12" panose="02020600000000000000" pitchFamily="18" charset="-127"/>
+            </a:endParaRPr>
+          </a:p>
+        </p:txBody>
+      </p:sp>
+      <p:sp>
+        <p:nvSpPr>
+          <p:cNvPr id="10" name="TextBox 9">
+            <a:extLst>
+              <a:ext uri="{FF2B5EF4-FFF2-40B4-BE49-F238E27FC236}">
+                <a16:creationId xmlns:a16="http://schemas.microsoft.com/office/drawing/2014/main" id="{40BECEC3-9F8F-4CE9-B48B-193AFE5A353F}"/>
+              </a:ext>
+            </a:extLst>
+          </p:cNvPr>
+          <p:cNvSpPr txBox="1"/>
+          <p:nvPr/>
+        </p:nvSpPr>
+        <p:spPr>
+          <a:xfrm>
+            <a:off x="4248444" y="302683"/>
+            <a:ext cx="3010486" cy="1569660"/>
+          </a:xfrm>
+          <a:prstGeom prst="rect">
+            <a:avLst/>
+          </a:prstGeom>
+          <a:noFill/>
+        </p:spPr>
+        <p:txBody>
+          <a:bodyPr wrap="square" rtlCol="0">
+            <a:spAutoFit/>
+          </a:bodyPr>
+          <a:lstStyle/>
+          <a:p>
+            <a:r>
+              <a:rPr lang="en-US" altLang="ko-KR" sz="2400" dirty="0">
+                <a:latin typeface="a고딕12" panose="02020600000000000000" pitchFamily="18" charset="-127"/>
+                <a:ea typeface="a고딕12" panose="02020600000000000000" pitchFamily="18" charset="-127"/>
+              </a:rPr>
+              <a:t>- erase</a:t>
+            </a:r>
+          </a:p>
+          <a:p>
+            <a:r>
+              <a:rPr lang="en-US" altLang="ko-KR" sz="2400" dirty="0">
+                <a:latin typeface="a고딕12" panose="02020600000000000000" pitchFamily="18" charset="-127"/>
+                <a:ea typeface="a고딕12" panose="02020600000000000000" pitchFamily="18" charset="-127"/>
+              </a:rPr>
+              <a:t>- calculate </a:t>
+            </a:r>
+            <a:r>
+              <a:rPr lang="en-US" altLang="ko-KR" sz="2400" dirty="0" err="1">
+                <a:latin typeface="a고딕12" panose="02020600000000000000" pitchFamily="18" charset="-127"/>
+                <a:ea typeface="a고딕12" panose="02020600000000000000" pitchFamily="18" charset="-127"/>
+              </a:rPr>
+              <a:t>maxValue</a:t>
+            </a:r>
+            <a:endParaRPr lang="en-US" altLang="ko-KR" sz="2400" dirty="0">
+              <a:latin typeface="a고딕12" panose="02020600000000000000" pitchFamily="18" charset="-127"/>
+              <a:ea typeface="a고딕12" panose="02020600000000000000" pitchFamily="18" charset="-127"/>
+            </a:endParaRPr>
+          </a:p>
+          <a:p>
+            <a:r>
+              <a:rPr lang="en-US" altLang="ko-KR" sz="2400" dirty="0">
+                <a:latin typeface="a고딕12" panose="02020600000000000000" pitchFamily="18" charset="-127"/>
+                <a:ea typeface="a고딕12" panose="02020600000000000000" pitchFamily="18" charset="-127"/>
+              </a:rPr>
+              <a:t>- count++</a:t>
+            </a:r>
+            <a:endParaRPr lang="ko-KR" altLang="en-US" sz="2400" dirty="0">
+              <a:latin typeface="a고딕12" panose="02020600000000000000" pitchFamily="18" charset="-127"/>
+              <a:ea typeface="a고딕12" panose="02020600000000000000" pitchFamily="18" charset="-127"/>
+            </a:endParaRPr>
+          </a:p>
+        </p:txBody>
+      </p:sp>
+      <p:sp>
+        <p:nvSpPr>
+          <p:cNvPr id="11" name="TextBox 10">
+            <a:extLst>
+              <a:ext uri="{FF2B5EF4-FFF2-40B4-BE49-F238E27FC236}">
+                <a16:creationId xmlns:a16="http://schemas.microsoft.com/office/drawing/2014/main" id="{FDCAE934-640C-498B-A8A2-4F89056D6D47}"/>
+              </a:ext>
+            </a:extLst>
+          </p:cNvPr>
+          <p:cNvSpPr txBox="1"/>
+          <p:nvPr/>
+        </p:nvSpPr>
+        <p:spPr>
+          <a:xfrm>
+            <a:off x="642257" y="467628"/>
+            <a:ext cx="3494314" cy="830997"/>
+          </a:xfrm>
+          <a:prstGeom prst="rect">
+            <a:avLst/>
+          </a:prstGeom>
+          <a:noFill/>
+        </p:spPr>
+        <p:txBody>
+          <a:bodyPr wrap="square" rtlCol="0">
+            <a:spAutoFit/>
+          </a:bodyPr>
+          <a:lstStyle/>
+          <a:p>
+            <a:r>
+              <a:rPr lang="en-US" altLang="ko-KR" sz="2400" dirty="0">
+                <a:latin typeface="a고딕12" panose="02020600000000000000" pitchFamily="18" charset="-127"/>
+                <a:ea typeface="a고딕12" panose="02020600000000000000" pitchFamily="18" charset="-127"/>
+              </a:rPr>
+              <a:t>count = 1</a:t>
+            </a:r>
+          </a:p>
+          <a:p>
+            <a:r>
+              <a:rPr lang="en-US" altLang="ko-KR" sz="2400" dirty="0" err="1">
+                <a:latin typeface="a고딕12" panose="02020600000000000000" pitchFamily="18" charset="-127"/>
+                <a:ea typeface="a고딕12" panose="02020600000000000000" pitchFamily="18" charset="-127"/>
+              </a:rPr>
+              <a:t>maxValue</a:t>
+            </a:r>
+            <a:r>
+              <a:rPr lang="en-US" altLang="ko-KR" sz="2400" dirty="0">
+                <a:latin typeface="a고딕12" panose="02020600000000000000" pitchFamily="18" charset="-127"/>
+                <a:ea typeface="a고딕12" panose="02020600000000000000" pitchFamily="18" charset="-127"/>
+              </a:rPr>
+              <a:t> = 9</a:t>
+            </a:r>
+            <a:endParaRPr lang="ko-KR" altLang="en-US" sz="2400" dirty="0">
+              <a:latin typeface="a고딕12" panose="02020600000000000000" pitchFamily="18" charset="-127"/>
+              <a:ea typeface="a고딕12" panose="02020600000000000000" pitchFamily="18" charset="-127"/>
+            </a:endParaRPr>
+          </a:p>
+        </p:txBody>
+      </p:sp>
+      <p:graphicFrame>
+        <p:nvGraphicFramePr>
+          <p:cNvPr id="12" name="표 4">
+            <a:extLst>
+              <a:ext uri="{FF2B5EF4-FFF2-40B4-BE49-F238E27FC236}">
+                <a16:creationId xmlns:a16="http://schemas.microsoft.com/office/drawing/2014/main" id="{A84C31F6-68F3-42AE-8A98-5A6C6070CFC3}"/>
+              </a:ext>
+            </a:extLst>
+          </p:cNvPr>
+          <p:cNvGraphicFramePr>
+            <a:graphicFrameLocks noGrp="1"/>
+          </p:cNvGraphicFramePr>
+          <p:nvPr>
+            <p:extLst>
+              <p:ext uri="{D42A27DB-BD31-4B8C-83A1-F6EECF244321}">
+                <p14:modId xmlns:p14="http://schemas.microsoft.com/office/powerpoint/2010/main" val="3749459967"/>
+              </p:ext>
+            </p:extLst>
+          </p:nvPr>
+        </p:nvGraphicFramePr>
+        <p:xfrm>
+          <a:off x="240391" y="1949015"/>
+          <a:ext cx="7757888" cy="2024743"/>
+        </p:xfrm>
+        <a:graphic>
+          <a:graphicData uri="http://schemas.openxmlformats.org/drawingml/2006/table">
+            <a:tbl>
+              <a:tblPr firstRow="1" bandRow="1">
+                <a:tableStyleId>{5C22544A-7EE6-4342-B048-85BDC9FD1C3A}</a:tableStyleId>
+              </a:tblPr>
+              <a:tblGrid>
+                <a:gridCol w="1939472">
+                  <a:extLst>
+                    <a:ext uri="{9D8B030D-6E8A-4147-A177-3AD203B41FA5}">
+                      <a16:colId xmlns:a16="http://schemas.microsoft.com/office/drawing/2014/main" val="1653098086"/>
+                    </a:ext>
+                  </a:extLst>
+                </a:gridCol>
+                <a:gridCol w="1939472">
+                  <a:extLst>
+                    <a:ext uri="{9D8B030D-6E8A-4147-A177-3AD203B41FA5}">
+                      <a16:colId xmlns:a16="http://schemas.microsoft.com/office/drawing/2014/main" val="4009950614"/>
+                    </a:ext>
+                  </a:extLst>
+                </a:gridCol>
+                <a:gridCol w="1939472">
+                  <a:extLst>
+                    <a:ext uri="{9D8B030D-6E8A-4147-A177-3AD203B41FA5}">
+                      <a16:colId xmlns:a16="http://schemas.microsoft.com/office/drawing/2014/main" val="1897946193"/>
+                    </a:ext>
+                  </a:extLst>
+                </a:gridCol>
+                <a:gridCol w="1939472">
+                  <a:extLst>
+                    <a:ext uri="{9D8B030D-6E8A-4147-A177-3AD203B41FA5}">
+                      <a16:colId xmlns:a16="http://schemas.microsoft.com/office/drawing/2014/main" val="2706033229"/>
+                    </a:ext>
+                  </a:extLst>
+                </a:gridCol>
+              </a:tblGrid>
+              <a:tr h="2024743">
+                <a:tc>
+                  <a:txBody>
+                    <a:bodyPr/>
+                    <a:lstStyle/>
+                    <a:p>
+                      <a:pPr algn="ctr" latinLnBrk="1"/>
+                      <a:r>
+                        <a:rPr lang="en-US" altLang="ko-KR" sz="7000" dirty="0">
+                          <a:latin typeface="a고딕14" panose="02020600000000000000" pitchFamily="18" charset="-127"/>
+                          <a:ea typeface="a고딕14" panose="02020600000000000000" pitchFamily="18" charset="-127"/>
+                        </a:rPr>
+                        <a:t>1</a:t>
+                      </a:r>
+                      <a:endParaRPr lang="ko-KR" altLang="en-US" sz="7000" dirty="0">
+                        <a:latin typeface="a고딕14" panose="02020600000000000000" pitchFamily="18" charset="-127"/>
+                        <a:ea typeface="a고딕14" panose="02020600000000000000" pitchFamily="18" charset="-127"/>
+                      </a:endParaRPr>
+                    </a:p>
+                  </a:txBody>
+                  <a:tcPr anchor="ctr"/>
+                </a:tc>
+                <a:tc>
+                  <a:txBody>
+                    <a:bodyPr/>
+                    <a:lstStyle/>
+                    <a:p>
+                      <a:pPr algn="ctr" latinLnBrk="1"/>
+                      <a:r>
+                        <a:rPr lang="en-US" altLang="ko-KR" sz="7000" dirty="0">
+                          <a:latin typeface="a고딕14" panose="02020600000000000000" pitchFamily="18" charset="-127"/>
+                          <a:ea typeface="a고딕14" panose="02020600000000000000" pitchFamily="18" charset="-127"/>
+                        </a:rPr>
+                        <a:t>1</a:t>
+                      </a:r>
+                      <a:endParaRPr lang="ko-KR" altLang="en-US" sz="7000" dirty="0">
+                        <a:latin typeface="a고딕14" panose="02020600000000000000" pitchFamily="18" charset="-127"/>
+                        <a:ea typeface="a고딕14" panose="02020600000000000000" pitchFamily="18" charset="-127"/>
+                      </a:endParaRPr>
+                    </a:p>
+                  </a:txBody>
+                  <a:tcPr anchor="ctr"/>
+                </a:tc>
+                <a:tc>
+                  <a:txBody>
+                    <a:bodyPr/>
+                    <a:lstStyle/>
+                    <a:p>
+                      <a:pPr algn="ctr" latinLnBrk="1"/>
+                      <a:r>
+                        <a:rPr lang="en-US" altLang="ko-KR" sz="7000" dirty="0">
+                          <a:latin typeface="a고딕14" panose="02020600000000000000" pitchFamily="18" charset="-127"/>
+                          <a:ea typeface="a고딕14" panose="02020600000000000000" pitchFamily="18" charset="-127"/>
+                        </a:rPr>
+                        <a:t>1</a:t>
+                      </a:r>
+                      <a:endParaRPr lang="ko-KR" altLang="en-US" sz="7000" dirty="0">
+                        <a:latin typeface="a고딕14" panose="02020600000000000000" pitchFamily="18" charset="-127"/>
+                        <a:ea typeface="a고딕14" panose="02020600000000000000" pitchFamily="18" charset="-127"/>
+                      </a:endParaRPr>
+                    </a:p>
+                  </a:txBody>
+                  <a:tcPr anchor="ctr"/>
+                </a:tc>
+                <a:tc>
+                  <a:txBody>
+                    <a:bodyPr/>
+                    <a:lstStyle/>
+                    <a:p>
+                      <a:pPr algn="ctr" latinLnBrk="1"/>
+                      <a:r>
+                        <a:rPr lang="en-US" altLang="ko-KR" sz="7000" dirty="0">
+                          <a:latin typeface="a고딕14" panose="02020600000000000000" pitchFamily="18" charset="-127"/>
+                          <a:ea typeface="a고딕14" panose="02020600000000000000" pitchFamily="18" charset="-127"/>
+                        </a:rPr>
+                        <a:t>1</a:t>
+                      </a:r>
+                      <a:endParaRPr lang="ko-KR" altLang="en-US" sz="7000" dirty="0">
+                        <a:latin typeface="a고딕14" panose="02020600000000000000" pitchFamily="18" charset="-127"/>
+                        <a:ea typeface="a고딕14" panose="02020600000000000000" pitchFamily="18" charset="-127"/>
+                      </a:endParaRPr>
+                    </a:p>
+                  </a:txBody>
+                  <a:tcPr anchor="ctr"/>
+                </a:tc>
+                <a:extLst>
+                  <a:ext uri="{0D108BD9-81ED-4DB2-BD59-A6C34878D82A}">
+                    <a16:rowId xmlns:a16="http://schemas.microsoft.com/office/drawing/2014/main" val="3503805624"/>
+                  </a:ext>
+                </a:extLst>
+              </a:tr>
+            </a:tbl>
+          </a:graphicData>
+        </a:graphic>
+      </p:graphicFrame>
+      <p:graphicFrame>
+        <p:nvGraphicFramePr>
+          <p:cNvPr id="13" name="표 4">
+            <a:extLst>
+              <a:ext uri="{FF2B5EF4-FFF2-40B4-BE49-F238E27FC236}">
+                <a16:creationId xmlns:a16="http://schemas.microsoft.com/office/drawing/2014/main" id="{64C35B98-D718-4717-903E-73ABA3EF2D20}"/>
+              </a:ext>
+            </a:extLst>
+          </p:cNvPr>
+          <p:cNvGraphicFramePr>
+            <a:graphicFrameLocks noGrp="1"/>
+          </p:cNvGraphicFramePr>
+          <p:nvPr>
+            <p:extLst>
+              <p:ext uri="{D42A27DB-BD31-4B8C-83A1-F6EECF244321}">
+                <p14:modId xmlns:p14="http://schemas.microsoft.com/office/powerpoint/2010/main" val="3124174715"/>
+              </p:ext>
+            </p:extLst>
+          </p:nvPr>
+        </p:nvGraphicFramePr>
+        <p:xfrm>
+          <a:off x="230413" y="1960373"/>
+          <a:ext cx="5818416" cy="2024743"/>
+        </p:xfrm>
+        <a:graphic>
+          <a:graphicData uri="http://schemas.openxmlformats.org/drawingml/2006/table">
+            <a:tbl>
+              <a:tblPr firstRow="1" bandRow="1">
+                <a:tableStyleId>{5C22544A-7EE6-4342-B048-85BDC9FD1C3A}</a:tableStyleId>
+              </a:tblPr>
+              <a:tblGrid>
+                <a:gridCol w="1939472">
+                  <a:extLst>
+                    <a:ext uri="{9D8B030D-6E8A-4147-A177-3AD203B41FA5}">
+                      <a16:colId xmlns:a16="http://schemas.microsoft.com/office/drawing/2014/main" val="1653098086"/>
+                    </a:ext>
+                  </a:extLst>
+                </a:gridCol>
+                <a:gridCol w="1939472">
+                  <a:extLst>
+                    <a:ext uri="{9D8B030D-6E8A-4147-A177-3AD203B41FA5}">
+                      <a16:colId xmlns:a16="http://schemas.microsoft.com/office/drawing/2014/main" val="4009950614"/>
+                    </a:ext>
+                  </a:extLst>
+                </a:gridCol>
+                <a:gridCol w="1939472">
+                  <a:extLst>
+                    <a:ext uri="{9D8B030D-6E8A-4147-A177-3AD203B41FA5}">
+                      <a16:colId xmlns:a16="http://schemas.microsoft.com/office/drawing/2014/main" val="2706033229"/>
+                    </a:ext>
+                  </a:extLst>
+                </a:gridCol>
+              </a:tblGrid>
+              <a:tr h="2024743">
+                <a:tc>
+                  <a:txBody>
+                    <a:bodyPr/>
+                    <a:lstStyle/>
+                    <a:p>
+                      <a:pPr algn="ctr" latinLnBrk="1"/>
+                      <a:r>
+                        <a:rPr lang="en-US" altLang="ko-KR" sz="7000" dirty="0">
+                          <a:latin typeface="a고딕14" panose="02020600000000000000" pitchFamily="18" charset="-127"/>
+                          <a:ea typeface="a고딕14" panose="02020600000000000000" pitchFamily="18" charset="-127"/>
+                        </a:rPr>
+                        <a:t>1</a:t>
+                      </a:r>
+                      <a:endParaRPr lang="ko-KR" altLang="en-US" sz="7000" dirty="0">
+                        <a:latin typeface="a고딕14" panose="02020600000000000000" pitchFamily="18" charset="-127"/>
+                        <a:ea typeface="a고딕14" panose="02020600000000000000" pitchFamily="18" charset="-127"/>
+                      </a:endParaRPr>
+                    </a:p>
+                  </a:txBody>
+                  <a:tcPr anchor="ctr"/>
+                </a:tc>
+                <a:tc>
+                  <a:txBody>
+                    <a:bodyPr/>
+                    <a:lstStyle/>
+                    <a:p>
+                      <a:pPr algn="ctr" latinLnBrk="1"/>
+                      <a:r>
+                        <a:rPr lang="en-US" altLang="ko-KR" sz="7000" dirty="0">
+                          <a:latin typeface="a고딕14" panose="02020600000000000000" pitchFamily="18" charset="-127"/>
+                          <a:ea typeface="a고딕14" panose="02020600000000000000" pitchFamily="18" charset="-127"/>
+                        </a:rPr>
+                        <a:t>1</a:t>
+                      </a:r>
+                      <a:endParaRPr lang="ko-KR" altLang="en-US" sz="7000" dirty="0">
+                        <a:latin typeface="a고딕14" panose="02020600000000000000" pitchFamily="18" charset="-127"/>
+                        <a:ea typeface="a고딕14" panose="02020600000000000000" pitchFamily="18" charset="-127"/>
+                      </a:endParaRPr>
+                    </a:p>
+                  </a:txBody>
+                  <a:tcPr anchor="ctr"/>
+                </a:tc>
+                <a:tc>
+                  <a:txBody>
+                    <a:bodyPr/>
+                    <a:lstStyle/>
+                    <a:p>
+                      <a:pPr algn="ctr" latinLnBrk="1"/>
+                      <a:r>
+                        <a:rPr lang="en-US" altLang="ko-KR" sz="7000" dirty="0">
+                          <a:latin typeface="a고딕14" panose="02020600000000000000" pitchFamily="18" charset="-127"/>
+                          <a:ea typeface="a고딕14" panose="02020600000000000000" pitchFamily="18" charset="-127"/>
+                        </a:rPr>
+                        <a:t>1</a:t>
+                      </a:r>
+                      <a:endParaRPr lang="ko-KR" altLang="en-US" sz="7000" dirty="0">
+                        <a:latin typeface="a고딕14" panose="02020600000000000000" pitchFamily="18" charset="-127"/>
+                        <a:ea typeface="a고딕14" panose="02020600000000000000" pitchFamily="18" charset="-127"/>
+                      </a:endParaRPr>
+                    </a:p>
+                  </a:txBody>
+                  <a:tcPr anchor="ctr"/>
+                </a:tc>
+                <a:extLst>
+                  <a:ext uri="{0D108BD9-81ED-4DB2-BD59-A6C34878D82A}">
+                    <a16:rowId xmlns:a16="http://schemas.microsoft.com/office/drawing/2014/main" val="3503805624"/>
+                  </a:ext>
+                </a:extLst>
+              </a:tr>
+            </a:tbl>
+          </a:graphicData>
+        </a:graphic>
+      </p:graphicFrame>
+      <p:sp>
+        <p:nvSpPr>
+          <p:cNvPr id="14" name="TextBox 13">
+            <a:extLst>
+              <a:ext uri="{FF2B5EF4-FFF2-40B4-BE49-F238E27FC236}">
+                <a16:creationId xmlns:a16="http://schemas.microsoft.com/office/drawing/2014/main" id="{52071DEB-F4D2-4AEE-AFEC-CA56EECEF0E4}"/>
+              </a:ext>
+            </a:extLst>
+          </p:cNvPr>
+          <p:cNvSpPr txBox="1"/>
+          <p:nvPr/>
+        </p:nvSpPr>
+        <p:spPr>
+          <a:xfrm>
+            <a:off x="642257" y="473307"/>
+            <a:ext cx="3494314" cy="830997"/>
+          </a:xfrm>
+          <a:prstGeom prst="rect">
+            <a:avLst/>
+          </a:prstGeom>
+          <a:noFill/>
+        </p:spPr>
+        <p:txBody>
+          <a:bodyPr wrap="square" rtlCol="0">
+            <a:spAutoFit/>
+          </a:bodyPr>
+          <a:lstStyle/>
+          <a:p>
+            <a:r>
+              <a:rPr lang="en-US" altLang="ko-KR" sz="2400" dirty="0">
+                <a:latin typeface="a고딕12" panose="02020600000000000000" pitchFamily="18" charset="-127"/>
+                <a:ea typeface="a고딕12" panose="02020600000000000000" pitchFamily="18" charset="-127"/>
+              </a:rPr>
+              <a:t>count = 2</a:t>
+            </a:r>
+          </a:p>
+          <a:p>
+            <a:r>
+              <a:rPr lang="en-US" altLang="ko-KR" sz="2400" dirty="0" err="1">
+                <a:latin typeface="a고딕12" panose="02020600000000000000" pitchFamily="18" charset="-127"/>
+                <a:ea typeface="a고딕12" panose="02020600000000000000" pitchFamily="18" charset="-127"/>
+              </a:rPr>
+              <a:t>maxValue</a:t>
+            </a:r>
+            <a:r>
+              <a:rPr lang="en-US" altLang="ko-KR" sz="2400" dirty="0">
+                <a:latin typeface="a고딕12" panose="02020600000000000000" pitchFamily="18" charset="-127"/>
+                <a:ea typeface="a고딕12" panose="02020600000000000000" pitchFamily="18" charset="-127"/>
+              </a:rPr>
+              <a:t> = 9</a:t>
+            </a:r>
+            <a:endParaRPr lang="ko-KR" altLang="en-US" sz="2400" dirty="0">
+              <a:latin typeface="a고딕12" panose="02020600000000000000" pitchFamily="18" charset="-127"/>
+              <a:ea typeface="a고딕12" panose="02020600000000000000" pitchFamily="18" charset="-127"/>
+            </a:endParaRPr>
+          </a:p>
+        </p:txBody>
+      </p:sp>
+      <p:sp>
+        <p:nvSpPr>
+          <p:cNvPr id="15" name="TextBox 14">
+            <a:extLst>
+              <a:ext uri="{FF2B5EF4-FFF2-40B4-BE49-F238E27FC236}">
+                <a16:creationId xmlns:a16="http://schemas.microsoft.com/office/drawing/2014/main" id="{E3330C12-197C-4E45-A0E8-48C2BD3B79DD}"/>
+              </a:ext>
+            </a:extLst>
+          </p:cNvPr>
+          <p:cNvSpPr txBox="1"/>
+          <p:nvPr/>
+        </p:nvSpPr>
+        <p:spPr>
+          <a:xfrm>
+            <a:off x="642257" y="475598"/>
+            <a:ext cx="3494314" cy="830997"/>
+          </a:xfrm>
+          <a:prstGeom prst="rect">
+            <a:avLst/>
+          </a:prstGeom>
+          <a:noFill/>
+        </p:spPr>
+        <p:txBody>
+          <a:bodyPr wrap="square" rtlCol="0">
+            <a:spAutoFit/>
+          </a:bodyPr>
+          <a:lstStyle/>
+          <a:p>
+            <a:r>
+              <a:rPr lang="en-US" altLang="ko-KR" sz="2400" dirty="0">
+                <a:latin typeface="a고딕12" panose="02020600000000000000" pitchFamily="18" charset="-127"/>
+                <a:ea typeface="a고딕12" panose="02020600000000000000" pitchFamily="18" charset="-127"/>
+              </a:rPr>
+              <a:t>count = 3</a:t>
+            </a:r>
+          </a:p>
+          <a:p>
+            <a:r>
+              <a:rPr lang="en-US" altLang="ko-KR" sz="2400" dirty="0" err="1">
+                <a:latin typeface="a고딕12" panose="02020600000000000000" pitchFamily="18" charset="-127"/>
+                <a:ea typeface="a고딕12" panose="02020600000000000000" pitchFamily="18" charset="-127"/>
+              </a:rPr>
+              <a:t>maxValue</a:t>
+            </a:r>
+            <a:r>
+              <a:rPr lang="en-US" altLang="ko-KR" sz="2400" dirty="0">
+                <a:latin typeface="a고딕12" panose="02020600000000000000" pitchFamily="18" charset="-127"/>
+                <a:ea typeface="a고딕12" panose="02020600000000000000" pitchFamily="18" charset="-127"/>
+              </a:rPr>
+              <a:t> = 9</a:t>
+            </a:r>
+            <a:endParaRPr lang="ko-KR" altLang="en-US" sz="2400" dirty="0">
+              <a:latin typeface="a고딕12" panose="02020600000000000000" pitchFamily="18" charset="-127"/>
+              <a:ea typeface="a고딕12" panose="02020600000000000000" pitchFamily="18" charset="-127"/>
+            </a:endParaRPr>
+          </a:p>
+        </p:txBody>
+      </p:sp>
+      <p:graphicFrame>
+        <p:nvGraphicFramePr>
+          <p:cNvPr id="17" name="표 4">
+            <a:extLst>
+              <a:ext uri="{FF2B5EF4-FFF2-40B4-BE49-F238E27FC236}">
+                <a16:creationId xmlns:a16="http://schemas.microsoft.com/office/drawing/2014/main" id="{910D73EA-8868-4B77-BAF2-AF436114DFF6}"/>
+              </a:ext>
+            </a:extLst>
+          </p:cNvPr>
+          <p:cNvGraphicFramePr>
+            <a:graphicFrameLocks noGrp="1"/>
+          </p:cNvGraphicFramePr>
+          <p:nvPr>
+            <p:extLst>
+              <p:ext uri="{D42A27DB-BD31-4B8C-83A1-F6EECF244321}">
+                <p14:modId xmlns:p14="http://schemas.microsoft.com/office/powerpoint/2010/main" val="3880938859"/>
+              </p:ext>
+            </p:extLst>
+          </p:nvPr>
+        </p:nvGraphicFramePr>
+        <p:xfrm>
+          <a:off x="230413" y="1958956"/>
+          <a:ext cx="3878944" cy="2024743"/>
+        </p:xfrm>
+        <a:graphic>
+          <a:graphicData uri="http://schemas.openxmlformats.org/drawingml/2006/table">
+            <a:tbl>
+              <a:tblPr firstRow="1" bandRow="1">
+                <a:tableStyleId>{5C22544A-7EE6-4342-B048-85BDC9FD1C3A}</a:tableStyleId>
+              </a:tblPr>
+              <a:tblGrid>
+                <a:gridCol w="1939472">
+                  <a:extLst>
+                    <a:ext uri="{9D8B030D-6E8A-4147-A177-3AD203B41FA5}">
+                      <a16:colId xmlns:a16="http://schemas.microsoft.com/office/drawing/2014/main" val="1653098086"/>
+                    </a:ext>
+                  </a:extLst>
+                </a:gridCol>
+                <a:gridCol w="1939472">
+                  <a:extLst>
+                    <a:ext uri="{9D8B030D-6E8A-4147-A177-3AD203B41FA5}">
+                      <a16:colId xmlns:a16="http://schemas.microsoft.com/office/drawing/2014/main" val="4009950614"/>
+                    </a:ext>
+                  </a:extLst>
+                </a:gridCol>
+              </a:tblGrid>
+              <a:tr h="2024743">
+                <a:tc>
+                  <a:txBody>
+                    <a:bodyPr/>
+                    <a:lstStyle/>
+                    <a:p>
+                      <a:pPr algn="ctr" latinLnBrk="1"/>
+                      <a:r>
+                        <a:rPr lang="en-US" altLang="ko-KR" sz="7000" dirty="0">
+                          <a:latin typeface="a고딕14" panose="02020600000000000000" pitchFamily="18" charset="-127"/>
+                          <a:ea typeface="a고딕14" panose="02020600000000000000" pitchFamily="18" charset="-127"/>
+                        </a:rPr>
+                        <a:t>1</a:t>
+                      </a:r>
+                      <a:endParaRPr lang="ko-KR" altLang="en-US" sz="7000" dirty="0">
+                        <a:latin typeface="a고딕14" panose="02020600000000000000" pitchFamily="18" charset="-127"/>
+                        <a:ea typeface="a고딕14" panose="02020600000000000000" pitchFamily="18" charset="-127"/>
+                      </a:endParaRPr>
+                    </a:p>
+                  </a:txBody>
+                  <a:tcPr anchor="ctr"/>
+                </a:tc>
+                <a:tc>
+                  <a:txBody>
+                    <a:bodyPr/>
+                    <a:lstStyle/>
+                    <a:p>
+                      <a:pPr algn="ctr" latinLnBrk="1"/>
+                      <a:r>
+                        <a:rPr lang="en-US" altLang="ko-KR" sz="7000" dirty="0">
+                          <a:latin typeface="a고딕14" panose="02020600000000000000" pitchFamily="18" charset="-127"/>
+                          <a:ea typeface="a고딕14" panose="02020600000000000000" pitchFamily="18" charset="-127"/>
+                        </a:rPr>
+                        <a:t>1</a:t>
+                      </a:r>
+                      <a:endParaRPr lang="ko-KR" altLang="en-US" sz="7000" dirty="0">
+                        <a:latin typeface="a고딕14" panose="02020600000000000000" pitchFamily="18" charset="-127"/>
+                        <a:ea typeface="a고딕14" panose="02020600000000000000" pitchFamily="18" charset="-127"/>
+                      </a:endParaRPr>
+                    </a:p>
+                  </a:txBody>
+                  <a:tcPr anchor="ctr"/>
+                </a:tc>
+                <a:extLst>
+                  <a:ext uri="{0D108BD9-81ED-4DB2-BD59-A6C34878D82A}">
+                    <a16:rowId xmlns:a16="http://schemas.microsoft.com/office/drawing/2014/main" val="3503805624"/>
+                  </a:ext>
+                </a:extLst>
+              </a:tr>
+            </a:tbl>
+          </a:graphicData>
+        </a:graphic>
+      </p:graphicFrame>
+      <p:sp>
+        <p:nvSpPr>
+          <p:cNvPr id="18" name="TextBox 17">
+            <a:extLst>
+              <a:ext uri="{FF2B5EF4-FFF2-40B4-BE49-F238E27FC236}">
+                <a16:creationId xmlns:a16="http://schemas.microsoft.com/office/drawing/2014/main" id="{3D9D2366-7BDB-4810-BC3B-E6FEF7040D3B}"/>
+              </a:ext>
+            </a:extLst>
+          </p:cNvPr>
+          <p:cNvSpPr txBox="1"/>
+          <p:nvPr/>
+        </p:nvSpPr>
+        <p:spPr>
+          <a:xfrm>
+            <a:off x="642257" y="463034"/>
+            <a:ext cx="3494314" cy="830997"/>
+          </a:xfrm>
+          <a:prstGeom prst="rect">
+            <a:avLst/>
+          </a:prstGeom>
+          <a:noFill/>
+        </p:spPr>
+        <p:txBody>
+          <a:bodyPr wrap="square" rtlCol="0">
+            <a:spAutoFit/>
+          </a:bodyPr>
+          <a:lstStyle/>
+          <a:p>
+            <a:r>
+              <a:rPr lang="en-US" altLang="ko-KR" sz="2400" dirty="0">
+                <a:latin typeface="a고딕12" panose="02020600000000000000" pitchFamily="18" charset="-127"/>
+                <a:ea typeface="a고딕12" panose="02020600000000000000" pitchFamily="18" charset="-127"/>
+              </a:rPr>
+              <a:t>count = 4</a:t>
+            </a:r>
+          </a:p>
+          <a:p>
+            <a:r>
+              <a:rPr lang="en-US" altLang="ko-KR" sz="2400" dirty="0" err="1">
+                <a:latin typeface="a고딕12" panose="02020600000000000000" pitchFamily="18" charset="-127"/>
+                <a:ea typeface="a고딕12" panose="02020600000000000000" pitchFamily="18" charset="-127"/>
+              </a:rPr>
+              <a:t>maxValue</a:t>
+            </a:r>
+            <a:r>
+              <a:rPr lang="en-US" altLang="ko-KR" sz="2400" dirty="0">
+                <a:latin typeface="a고딕12" panose="02020600000000000000" pitchFamily="18" charset="-127"/>
+                <a:ea typeface="a고딕12" panose="02020600000000000000" pitchFamily="18" charset="-127"/>
+              </a:rPr>
+              <a:t> = 9</a:t>
+            </a:r>
+            <a:endParaRPr lang="ko-KR" altLang="en-US" sz="2400" dirty="0">
+              <a:latin typeface="a고딕12" panose="02020600000000000000" pitchFamily="18" charset="-127"/>
+              <a:ea typeface="a고딕12" panose="02020600000000000000" pitchFamily="18" charset="-127"/>
+            </a:endParaRPr>
+          </a:p>
+        </p:txBody>
+      </p:sp>
+      <p:sp>
+        <p:nvSpPr>
+          <p:cNvPr id="19" name="TextBox 18">
+            <a:extLst>
+              <a:ext uri="{FF2B5EF4-FFF2-40B4-BE49-F238E27FC236}">
+                <a16:creationId xmlns:a16="http://schemas.microsoft.com/office/drawing/2014/main" id="{A7F3F584-B84B-4032-8B9F-B34AA79E8D2B}"/>
+              </a:ext>
+            </a:extLst>
+          </p:cNvPr>
+          <p:cNvSpPr txBox="1"/>
+          <p:nvPr/>
+        </p:nvSpPr>
+        <p:spPr>
+          <a:xfrm>
+            <a:off x="4248444" y="6228364"/>
+            <a:ext cx="3854548" cy="461665"/>
+          </a:xfrm>
+          <a:prstGeom prst="rect">
+            <a:avLst/>
+          </a:prstGeom>
+          <a:noFill/>
+        </p:spPr>
+        <p:txBody>
+          <a:bodyPr wrap="square" rtlCol="0">
+            <a:spAutoFit/>
+          </a:bodyPr>
+          <a:lstStyle/>
+          <a:p>
+            <a:r>
+              <a:rPr lang="en-US" altLang="ko-KR" sz="2400" dirty="0">
+                <a:latin typeface="a고딕12" panose="02020600000000000000" pitchFamily="18" charset="-127"/>
+                <a:ea typeface="a고딕12" panose="02020600000000000000" pitchFamily="18" charset="-127"/>
+              </a:rPr>
+              <a:t>index %= </a:t>
+            </a:r>
+            <a:r>
+              <a:rPr lang="en-US" altLang="ko-KR" sz="2400" dirty="0" err="1">
+                <a:latin typeface="a고딕12" panose="02020600000000000000" pitchFamily="18" charset="-127"/>
+                <a:ea typeface="a고딕12" panose="02020600000000000000" pitchFamily="18" charset="-127"/>
+              </a:rPr>
+              <a:t>arr.size</a:t>
+            </a:r>
+            <a:r>
+              <a:rPr lang="en-US" altLang="ko-KR" sz="2400" dirty="0">
+                <a:latin typeface="a고딕12" panose="02020600000000000000" pitchFamily="18" charset="-127"/>
+                <a:ea typeface="a고딕12" panose="02020600000000000000" pitchFamily="18" charset="-127"/>
+              </a:rPr>
+              <a:t>()</a:t>
+            </a:r>
+            <a:endParaRPr lang="ko-KR" altLang="en-US" sz="2400" dirty="0">
+              <a:latin typeface="a고딕12" panose="02020600000000000000" pitchFamily="18" charset="-127"/>
+              <a:ea typeface="a고딕12" panose="02020600000000000000" pitchFamily="18" charset="-127"/>
+            </a:endParaRPr>
+          </a:p>
+        </p:txBody>
+      </p:sp>
     </p:spTree>
     <p:extLst>
       <p:ext uri="{BB962C8B-B14F-4D97-AF65-F5344CB8AC3E}">
         <p14:creationId xmlns:p14="http://schemas.microsoft.com/office/powerpoint/2010/main" val="3031348724"/>
+      </p:ext>
+    </p:extLst>
+  </p:cSld>
+  <p:clrMapOvr>
+    <a:masterClrMapping/>
+  </p:clrMapOvr>
+  <p:timing>
+    <p:tnLst>
+      <p:par>
+        <p:cTn id="1" dur="indefinite" restart="never" nodeType="tmRoot">
+          <p:childTnLst>
+            <p:seq concurrent="1" nextAc="seek">
+              <p:cTn id="2" dur="indefinite" nodeType="mainSeq">
+                <p:childTnLst>
+                  <p:par>
+                    <p:cTn id="3" fill="hold">
+                      <p:stCondLst>
+                        <p:cond delay="indefinite"/>
+                      </p:stCondLst>
+                      <p:childTnLst>
+                        <p:par>
+                          <p:cTn id="4" fill="hold">
+                            <p:stCondLst>
+                              <p:cond delay="0"/>
+                            </p:stCondLst>
+                            <p:childTnLst>
+                              <p:par>
+                                <p:cTn id="5" presetID="63" presetClass="path" presetSubtype="0" accel="50000" decel="50000" fill="hold" nodeType="clickEffect">
+                                  <p:stCondLst>
+                                    <p:cond delay="0"/>
+                                  </p:stCondLst>
+                                  <p:childTnLst>
+                                    <p:animMotion origin="layout" path="M 5E-6 -1.11111E-6 L 0.16277 -1.11111E-6 " pathEditMode="relative" rAng="0" ptsTypes="AA">
+                                      <p:cBhvr>
+                                        <p:cTn id="6" dur="500" fill="hold"/>
+                                        <p:tgtEl>
+                                          <p:spTgt spid="6"/>
+                                        </p:tgtEl>
+                                        <p:attrNameLst>
+                                          <p:attrName>ppt_x</p:attrName>
+                                          <p:attrName>ppt_y</p:attrName>
+                                        </p:attrNameLst>
+                                      </p:cBhvr>
+                                      <p:rCtr x="8138" y="0"/>
+                                    </p:animMotion>
+                                  </p:childTnLst>
+                                </p:cTn>
+                              </p:par>
+                            </p:childTnLst>
+                          </p:cTn>
+                        </p:par>
+                      </p:childTnLst>
+                    </p:cTn>
+                  </p:par>
+                  <p:par>
+                    <p:cTn id="7" fill="hold">
+                      <p:stCondLst>
+                        <p:cond delay="indefinite"/>
+                      </p:stCondLst>
+                      <p:childTnLst>
+                        <p:par>
+                          <p:cTn id="8" fill="hold">
+                            <p:stCondLst>
+                              <p:cond delay="0"/>
+                            </p:stCondLst>
+                            <p:childTnLst>
+                              <p:par>
+                                <p:cTn id="9" presetID="42" presetClass="path" presetSubtype="0" accel="50000" decel="50000" fill="hold" nodeType="clickEffect">
+                                  <p:stCondLst>
+                                    <p:cond delay="0"/>
+                                  </p:stCondLst>
+                                  <p:childTnLst>
+                                    <p:animMotion origin="layout" path="M 0.16277 -1.11111E-6 L 0.32084 0.00278 " pathEditMode="relative" rAng="0" ptsTypes="AA">
+                                      <p:cBhvr>
+                                        <p:cTn id="10" dur="500" fill="hold"/>
+                                        <p:tgtEl>
+                                          <p:spTgt spid="6"/>
+                                        </p:tgtEl>
+                                        <p:attrNameLst>
+                                          <p:attrName>ppt_x</p:attrName>
+                                          <p:attrName>ppt_y</p:attrName>
+                                        </p:attrNameLst>
+                                      </p:cBhvr>
+                                      <p:rCtr x="7904" y="139"/>
+                                    </p:animMotion>
+                                  </p:childTnLst>
+                                </p:cTn>
+                              </p:par>
+                            </p:childTnLst>
+                          </p:cTn>
+                        </p:par>
+                      </p:childTnLst>
+                    </p:cTn>
+                  </p:par>
+                  <p:par>
+                    <p:cTn id="11" fill="hold">
+                      <p:stCondLst>
+                        <p:cond delay="indefinite"/>
+                      </p:stCondLst>
+                      <p:childTnLst>
+                        <p:par>
+                          <p:cTn id="12" fill="hold">
+                            <p:stCondLst>
+                              <p:cond delay="0"/>
+                            </p:stCondLst>
+                            <p:childTnLst>
+                              <p:par>
+                                <p:cTn id="13" presetID="10" presetClass="entr" presetSubtype="0" fill="hold" grpId="0" nodeType="clickEffect">
+                                  <p:stCondLst>
+                                    <p:cond delay="0"/>
+                                  </p:stCondLst>
+                                  <p:childTnLst>
+                                    <p:set>
+                                      <p:cBhvr>
+                                        <p:cTn id="14" dur="1" fill="hold">
+                                          <p:stCondLst>
+                                            <p:cond delay="0"/>
+                                          </p:stCondLst>
+                                        </p:cTn>
+                                        <p:tgtEl>
+                                          <p:spTgt spid="8"/>
+                                        </p:tgtEl>
+                                        <p:attrNameLst>
+                                          <p:attrName>style.visibility</p:attrName>
+                                        </p:attrNameLst>
+                                      </p:cBhvr>
+                                      <p:to>
+                                        <p:strVal val="visible"/>
+                                      </p:to>
+                                    </p:set>
+                                    <p:animEffect transition="in" filter="fade">
+                                      <p:cBhvr>
+                                        <p:cTn id="15" dur="500"/>
+                                        <p:tgtEl>
+                                          <p:spTgt spid="8"/>
+                                        </p:tgtEl>
+                                      </p:cBhvr>
+                                    </p:animEffect>
+                                  </p:childTnLst>
+                                </p:cTn>
+                              </p:par>
+                            </p:childTnLst>
+                          </p:cTn>
+                        </p:par>
+                      </p:childTnLst>
+                    </p:cTn>
+                  </p:par>
+                  <p:par>
+                    <p:cTn id="16" fill="hold">
+                      <p:stCondLst>
+                        <p:cond delay="indefinite"/>
+                      </p:stCondLst>
+                      <p:childTnLst>
+                        <p:par>
+                          <p:cTn id="17" fill="hold">
+                            <p:stCondLst>
+                              <p:cond delay="0"/>
+                            </p:stCondLst>
+                            <p:childTnLst>
+                              <p:par>
+                                <p:cTn id="18" presetID="10" presetClass="entr" presetSubtype="0" fill="hold" grpId="0" nodeType="clickEffect">
+                                  <p:stCondLst>
+                                    <p:cond delay="0"/>
+                                  </p:stCondLst>
+                                  <p:childTnLst>
+                                    <p:set>
+                                      <p:cBhvr>
+                                        <p:cTn id="19" dur="1" fill="hold">
+                                          <p:stCondLst>
+                                            <p:cond delay="0"/>
+                                          </p:stCondLst>
+                                        </p:cTn>
+                                        <p:tgtEl>
+                                          <p:spTgt spid="10"/>
+                                        </p:tgtEl>
+                                        <p:attrNameLst>
+                                          <p:attrName>style.visibility</p:attrName>
+                                        </p:attrNameLst>
+                                      </p:cBhvr>
+                                      <p:to>
+                                        <p:strVal val="visible"/>
+                                      </p:to>
+                                    </p:set>
+                                    <p:animEffect transition="in" filter="fade">
+                                      <p:cBhvr>
+                                        <p:cTn id="20" dur="500"/>
+                                        <p:tgtEl>
+                                          <p:spTgt spid="10"/>
+                                        </p:tgtEl>
+                                      </p:cBhvr>
+                                    </p:animEffect>
+                                  </p:childTnLst>
+                                </p:cTn>
+                              </p:par>
+                            </p:childTnLst>
+                          </p:cTn>
+                        </p:par>
+                      </p:childTnLst>
+                    </p:cTn>
+                  </p:par>
+                  <p:par>
+                    <p:cTn id="21" fill="hold">
+                      <p:stCondLst>
+                        <p:cond delay="indefinite"/>
+                      </p:stCondLst>
+                      <p:childTnLst>
+                        <p:par>
+                          <p:cTn id="22" fill="hold">
+                            <p:stCondLst>
+                              <p:cond delay="0"/>
+                            </p:stCondLst>
+                            <p:childTnLst>
+                              <p:par>
+                                <p:cTn id="23" presetID="10" presetClass="exit" presetSubtype="0" fill="hold" nodeType="clickEffect">
+                                  <p:stCondLst>
+                                    <p:cond delay="0"/>
+                                  </p:stCondLst>
+                                  <p:childTnLst>
+                                    <p:animEffect transition="out" filter="fade">
+                                      <p:cBhvr>
+                                        <p:cTn id="24" dur="500"/>
+                                        <p:tgtEl>
+                                          <p:spTgt spid="4"/>
+                                        </p:tgtEl>
+                                      </p:cBhvr>
+                                    </p:animEffect>
+                                    <p:set>
+                                      <p:cBhvr>
+                                        <p:cTn id="25" dur="1" fill="hold">
+                                          <p:stCondLst>
+                                            <p:cond delay="499"/>
+                                          </p:stCondLst>
+                                        </p:cTn>
+                                        <p:tgtEl>
+                                          <p:spTgt spid="4"/>
+                                        </p:tgtEl>
+                                        <p:attrNameLst>
+                                          <p:attrName>style.visibility</p:attrName>
+                                        </p:attrNameLst>
+                                      </p:cBhvr>
+                                      <p:to>
+                                        <p:strVal val="hidden"/>
+                                      </p:to>
+                                    </p:set>
+                                  </p:childTnLst>
+                                </p:cTn>
+                              </p:par>
+                              <p:par>
+                                <p:cTn id="26" presetID="10" presetClass="entr" presetSubtype="0" fill="hold" nodeType="withEffect">
+                                  <p:stCondLst>
+                                    <p:cond delay="0"/>
+                                  </p:stCondLst>
+                                  <p:childTnLst>
+                                    <p:set>
+                                      <p:cBhvr>
+                                        <p:cTn id="27" dur="1" fill="hold">
+                                          <p:stCondLst>
+                                            <p:cond delay="0"/>
+                                          </p:stCondLst>
+                                        </p:cTn>
+                                        <p:tgtEl>
+                                          <p:spTgt spid="7"/>
+                                        </p:tgtEl>
+                                        <p:attrNameLst>
+                                          <p:attrName>style.visibility</p:attrName>
+                                        </p:attrNameLst>
+                                      </p:cBhvr>
+                                      <p:to>
+                                        <p:strVal val="visible"/>
+                                      </p:to>
+                                    </p:set>
+                                    <p:animEffect transition="in" filter="fade">
+                                      <p:cBhvr>
+                                        <p:cTn id="28" dur="500"/>
+                                        <p:tgtEl>
+                                          <p:spTgt spid="7"/>
+                                        </p:tgtEl>
+                                      </p:cBhvr>
+                                    </p:animEffect>
+                                  </p:childTnLst>
+                                </p:cTn>
+                              </p:par>
+                              <p:par>
+                                <p:cTn id="29" presetID="1" presetClass="exit" presetSubtype="0" fill="hold" grpId="1" nodeType="withEffect">
+                                  <p:stCondLst>
+                                    <p:cond delay="0"/>
+                                  </p:stCondLst>
+                                  <p:childTnLst>
+                                    <p:set>
+                                      <p:cBhvr>
+                                        <p:cTn id="30" dur="1" fill="hold">
+                                          <p:stCondLst>
+                                            <p:cond delay="0"/>
+                                          </p:stCondLst>
+                                        </p:cTn>
+                                        <p:tgtEl>
+                                          <p:spTgt spid="8"/>
+                                        </p:tgtEl>
+                                        <p:attrNameLst>
+                                          <p:attrName>style.visibility</p:attrName>
+                                        </p:attrNameLst>
+                                      </p:cBhvr>
+                                      <p:to>
+                                        <p:strVal val="hidden"/>
+                                      </p:to>
+                                    </p:set>
+                                  </p:childTnLst>
+                                </p:cTn>
+                              </p:par>
+                              <p:par>
+                                <p:cTn id="31" presetID="1" presetClass="exit" presetSubtype="0" fill="hold" grpId="0" nodeType="withEffect">
+                                  <p:stCondLst>
+                                    <p:cond delay="0"/>
+                                  </p:stCondLst>
+                                  <p:childTnLst>
+                                    <p:set>
+                                      <p:cBhvr>
+                                        <p:cTn id="32" dur="1" fill="hold">
+                                          <p:stCondLst>
+                                            <p:cond delay="0"/>
+                                          </p:stCondLst>
+                                        </p:cTn>
+                                        <p:tgtEl>
+                                          <p:spTgt spid="3"/>
+                                        </p:tgtEl>
+                                        <p:attrNameLst>
+                                          <p:attrName>style.visibility</p:attrName>
+                                        </p:attrNameLst>
+                                      </p:cBhvr>
+                                      <p:to>
+                                        <p:strVal val="hidden"/>
+                                      </p:to>
+                                    </p:set>
+                                  </p:childTnLst>
+                                </p:cTn>
+                              </p:par>
+                              <p:par>
+                                <p:cTn id="33" presetID="1" presetClass="entr" presetSubtype="0" fill="hold" grpId="0" nodeType="withEffect">
+                                  <p:stCondLst>
+                                    <p:cond delay="0"/>
+                                  </p:stCondLst>
+                                  <p:childTnLst>
+                                    <p:set>
+                                      <p:cBhvr>
+                                        <p:cTn id="34" dur="1" fill="hold">
+                                          <p:stCondLst>
+                                            <p:cond delay="0"/>
+                                          </p:stCondLst>
+                                        </p:cTn>
+                                        <p:tgtEl>
+                                          <p:spTgt spid="11"/>
+                                        </p:tgtEl>
+                                        <p:attrNameLst>
+                                          <p:attrName>style.visibility</p:attrName>
+                                        </p:attrNameLst>
+                                      </p:cBhvr>
+                                      <p:to>
+                                        <p:strVal val="visible"/>
+                                      </p:to>
+                                    </p:set>
+                                  </p:childTnLst>
+                                </p:cTn>
+                              </p:par>
+                            </p:childTnLst>
+                          </p:cTn>
+                        </p:par>
+                      </p:childTnLst>
+                    </p:cTn>
+                  </p:par>
+                  <p:par>
+                    <p:cTn id="35" fill="hold">
+                      <p:stCondLst>
+                        <p:cond delay="indefinite"/>
+                      </p:stCondLst>
+                      <p:childTnLst>
+                        <p:par>
+                          <p:cTn id="36" fill="hold">
+                            <p:stCondLst>
+                              <p:cond delay="0"/>
+                            </p:stCondLst>
+                            <p:childTnLst>
+                              <p:par>
+                                <p:cTn id="37" presetID="1" presetClass="entr" presetSubtype="0" fill="hold" nodeType="clickEffect">
+                                  <p:stCondLst>
+                                    <p:cond delay="0"/>
+                                  </p:stCondLst>
+                                  <p:childTnLst>
+                                    <p:set>
+                                      <p:cBhvr>
+                                        <p:cTn id="38" dur="1" fill="hold">
+                                          <p:stCondLst>
+                                            <p:cond delay="0"/>
+                                          </p:stCondLst>
+                                        </p:cTn>
+                                        <p:tgtEl>
+                                          <p:spTgt spid="12"/>
+                                        </p:tgtEl>
+                                        <p:attrNameLst>
+                                          <p:attrName>style.visibility</p:attrName>
+                                        </p:attrNameLst>
+                                      </p:cBhvr>
+                                      <p:to>
+                                        <p:strVal val="visible"/>
+                                      </p:to>
+                                    </p:set>
+                                  </p:childTnLst>
+                                </p:cTn>
+                              </p:par>
+                              <p:par>
+                                <p:cTn id="39" presetID="10" presetClass="exit" presetSubtype="0" fill="hold" nodeType="withEffect">
+                                  <p:stCondLst>
+                                    <p:cond delay="0"/>
+                                  </p:stCondLst>
+                                  <p:childTnLst>
+                                    <p:animEffect transition="out" filter="fade">
+                                      <p:cBhvr>
+                                        <p:cTn id="40" dur="500"/>
+                                        <p:tgtEl>
+                                          <p:spTgt spid="7"/>
+                                        </p:tgtEl>
+                                      </p:cBhvr>
+                                    </p:animEffect>
+                                    <p:set>
+                                      <p:cBhvr>
+                                        <p:cTn id="41" dur="1" fill="hold">
+                                          <p:stCondLst>
+                                            <p:cond delay="499"/>
+                                          </p:stCondLst>
+                                        </p:cTn>
+                                        <p:tgtEl>
+                                          <p:spTgt spid="7"/>
+                                        </p:tgtEl>
+                                        <p:attrNameLst>
+                                          <p:attrName>style.visibility</p:attrName>
+                                        </p:attrNameLst>
+                                      </p:cBhvr>
+                                      <p:to>
+                                        <p:strVal val="hidden"/>
+                                      </p:to>
+                                    </p:set>
+                                  </p:childTnLst>
+                                </p:cTn>
+                              </p:par>
+                              <p:par>
+                                <p:cTn id="42" presetID="1" presetClass="entr" presetSubtype="0" fill="hold" grpId="0" nodeType="withEffect">
+                                  <p:stCondLst>
+                                    <p:cond delay="0"/>
+                                  </p:stCondLst>
+                                  <p:childTnLst>
+                                    <p:set>
+                                      <p:cBhvr>
+                                        <p:cTn id="43" dur="1" fill="hold">
+                                          <p:stCondLst>
+                                            <p:cond delay="0"/>
+                                          </p:stCondLst>
+                                        </p:cTn>
+                                        <p:tgtEl>
+                                          <p:spTgt spid="14"/>
+                                        </p:tgtEl>
+                                        <p:attrNameLst>
+                                          <p:attrName>style.visibility</p:attrName>
+                                        </p:attrNameLst>
+                                      </p:cBhvr>
+                                      <p:to>
+                                        <p:strVal val="visible"/>
+                                      </p:to>
+                                    </p:set>
+                                  </p:childTnLst>
+                                </p:cTn>
+                              </p:par>
+                              <p:par>
+                                <p:cTn id="44" presetID="1" presetClass="exit" presetSubtype="0" fill="hold" grpId="1" nodeType="withEffect">
+                                  <p:stCondLst>
+                                    <p:cond delay="0"/>
+                                  </p:stCondLst>
+                                  <p:childTnLst>
+                                    <p:set>
+                                      <p:cBhvr>
+                                        <p:cTn id="45" dur="1" fill="hold">
+                                          <p:stCondLst>
+                                            <p:cond delay="0"/>
+                                          </p:stCondLst>
+                                        </p:cTn>
+                                        <p:tgtEl>
+                                          <p:spTgt spid="11"/>
+                                        </p:tgtEl>
+                                        <p:attrNameLst>
+                                          <p:attrName>style.visibility</p:attrName>
+                                        </p:attrNameLst>
+                                      </p:cBhvr>
+                                      <p:to>
+                                        <p:strVal val="hidden"/>
+                                      </p:to>
+                                    </p:set>
+                                  </p:childTnLst>
+                                </p:cTn>
+                              </p:par>
+                            </p:childTnLst>
+                          </p:cTn>
+                        </p:par>
+                      </p:childTnLst>
+                    </p:cTn>
+                  </p:par>
+                  <p:par>
+                    <p:cTn id="46" fill="hold">
+                      <p:stCondLst>
+                        <p:cond delay="indefinite"/>
+                      </p:stCondLst>
+                      <p:childTnLst>
+                        <p:par>
+                          <p:cTn id="47" fill="hold">
+                            <p:stCondLst>
+                              <p:cond delay="0"/>
+                            </p:stCondLst>
+                            <p:childTnLst>
+                              <p:par>
+                                <p:cTn id="48" presetID="1" presetClass="exit" presetSubtype="0" fill="hold" nodeType="clickEffect">
+                                  <p:stCondLst>
+                                    <p:cond delay="0"/>
+                                  </p:stCondLst>
+                                  <p:childTnLst>
+                                    <p:set>
+                                      <p:cBhvr>
+                                        <p:cTn id="49" dur="1" fill="hold">
+                                          <p:stCondLst>
+                                            <p:cond delay="0"/>
+                                          </p:stCondLst>
+                                        </p:cTn>
+                                        <p:tgtEl>
+                                          <p:spTgt spid="12"/>
+                                        </p:tgtEl>
+                                        <p:attrNameLst>
+                                          <p:attrName>style.visibility</p:attrName>
+                                        </p:attrNameLst>
+                                      </p:cBhvr>
+                                      <p:to>
+                                        <p:strVal val="hidden"/>
+                                      </p:to>
+                                    </p:set>
+                                  </p:childTnLst>
+                                </p:cTn>
+                              </p:par>
+                              <p:par>
+                                <p:cTn id="50" presetID="1" presetClass="entr" presetSubtype="0" fill="hold" nodeType="withEffect">
+                                  <p:stCondLst>
+                                    <p:cond delay="0"/>
+                                  </p:stCondLst>
+                                  <p:childTnLst>
+                                    <p:set>
+                                      <p:cBhvr>
+                                        <p:cTn id="51" dur="1" fill="hold">
+                                          <p:stCondLst>
+                                            <p:cond delay="0"/>
+                                          </p:stCondLst>
+                                        </p:cTn>
+                                        <p:tgtEl>
+                                          <p:spTgt spid="13"/>
+                                        </p:tgtEl>
+                                        <p:attrNameLst>
+                                          <p:attrName>style.visibility</p:attrName>
+                                        </p:attrNameLst>
+                                      </p:cBhvr>
+                                      <p:to>
+                                        <p:strVal val="visible"/>
+                                      </p:to>
+                                    </p:set>
+                                  </p:childTnLst>
+                                </p:cTn>
+                              </p:par>
+                              <p:par>
+                                <p:cTn id="52" presetID="1" presetClass="exit" presetSubtype="0" fill="hold" grpId="1" nodeType="withEffect">
+                                  <p:stCondLst>
+                                    <p:cond delay="0"/>
+                                  </p:stCondLst>
+                                  <p:childTnLst>
+                                    <p:set>
+                                      <p:cBhvr>
+                                        <p:cTn id="53" dur="1" fill="hold">
+                                          <p:stCondLst>
+                                            <p:cond delay="0"/>
+                                          </p:stCondLst>
+                                        </p:cTn>
+                                        <p:tgtEl>
+                                          <p:spTgt spid="14"/>
+                                        </p:tgtEl>
+                                        <p:attrNameLst>
+                                          <p:attrName>style.visibility</p:attrName>
+                                        </p:attrNameLst>
+                                      </p:cBhvr>
+                                      <p:to>
+                                        <p:strVal val="hidden"/>
+                                      </p:to>
+                                    </p:set>
+                                  </p:childTnLst>
+                                </p:cTn>
+                              </p:par>
+                              <p:par>
+                                <p:cTn id="54" presetID="1" presetClass="entr" presetSubtype="0" fill="hold" grpId="0" nodeType="withEffect">
+                                  <p:stCondLst>
+                                    <p:cond delay="0"/>
+                                  </p:stCondLst>
+                                  <p:childTnLst>
+                                    <p:set>
+                                      <p:cBhvr>
+                                        <p:cTn id="55" dur="1" fill="hold">
+                                          <p:stCondLst>
+                                            <p:cond delay="0"/>
+                                          </p:stCondLst>
+                                        </p:cTn>
+                                        <p:tgtEl>
+                                          <p:spTgt spid="15"/>
+                                        </p:tgtEl>
+                                        <p:attrNameLst>
+                                          <p:attrName>style.visibility</p:attrName>
+                                        </p:attrNameLst>
+                                      </p:cBhvr>
+                                      <p:to>
+                                        <p:strVal val="visible"/>
+                                      </p:to>
+                                    </p:set>
+                                  </p:childTnLst>
+                                </p:cTn>
+                              </p:par>
+                            </p:childTnLst>
+                          </p:cTn>
+                        </p:par>
+                      </p:childTnLst>
+                    </p:cTn>
+                  </p:par>
+                  <p:par>
+                    <p:cTn id="56" fill="hold">
+                      <p:stCondLst>
+                        <p:cond delay="indefinite"/>
+                      </p:stCondLst>
+                      <p:childTnLst>
+                        <p:par>
+                          <p:cTn id="57" fill="hold">
+                            <p:stCondLst>
+                              <p:cond delay="0"/>
+                            </p:stCondLst>
+                            <p:childTnLst>
+                              <p:par>
+                                <p:cTn id="58" presetID="10" presetClass="entr" presetSubtype="0" fill="hold" grpId="0" nodeType="clickEffect">
+                                  <p:stCondLst>
+                                    <p:cond delay="0"/>
+                                  </p:stCondLst>
+                                  <p:childTnLst>
+                                    <p:set>
+                                      <p:cBhvr>
+                                        <p:cTn id="59" dur="1" fill="hold">
+                                          <p:stCondLst>
+                                            <p:cond delay="0"/>
+                                          </p:stCondLst>
+                                        </p:cTn>
+                                        <p:tgtEl>
+                                          <p:spTgt spid="19"/>
+                                        </p:tgtEl>
+                                        <p:attrNameLst>
+                                          <p:attrName>style.visibility</p:attrName>
+                                        </p:attrNameLst>
+                                      </p:cBhvr>
+                                      <p:to>
+                                        <p:strVal val="visible"/>
+                                      </p:to>
+                                    </p:set>
+                                    <p:animEffect transition="in" filter="fade">
+                                      <p:cBhvr>
+                                        <p:cTn id="60" dur="500"/>
+                                        <p:tgtEl>
+                                          <p:spTgt spid="19"/>
+                                        </p:tgtEl>
+                                      </p:cBhvr>
+                                    </p:animEffect>
+                                  </p:childTnLst>
+                                </p:cTn>
+                              </p:par>
+                            </p:childTnLst>
+                          </p:cTn>
+                        </p:par>
+                      </p:childTnLst>
+                    </p:cTn>
+                  </p:par>
+                  <p:par>
+                    <p:cTn id="61" fill="hold">
+                      <p:stCondLst>
+                        <p:cond delay="indefinite"/>
+                      </p:stCondLst>
+                      <p:childTnLst>
+                        <p:par>
+                          <p:cTn id="62" fill="hold">
+                            <p:stCondLst>
+                              <p:cond delay="0"/>
+                            </p:stCondLst>
+                            <p:childTnLst>
+                              <p:par>
+                                <p:cTn id="63" presetID="42" presetClass="path" presetSubtype="0" accel="50000" decel="50000" fill="hold" nodeType="clickEffect">
+                                  <p:stCondLst>
+                                    <p:cond delay="0"/>
+                                  </p:stCondLst>
+                                  <p:childTnLst>
+                                    <p:animMotion origin="layout" path="M 0.32084 0.00278 L 5E-6 -1.11111E-6 " pathEditMode="relative" rAng="0" ptsTypes="AA">
+                                      <p:cBhvr>
+                                        <p:cTn id="64" dur="500" fill="hold"/>
+                                        <p:tgtEl>
+                                          <p:spTgt spid="6"/>
+                                        </p:tgtEl>
+                                        <p:attrNameLst>
+                                          <p:attrName>ppt_x</p:attrName>
+                                          <p:attrName>ppt_y</p:attrName>
+                                        </p:attrNameLst>
+                                      </p:cBhvr>
+                                      <p:rCtr x="-16042" y="-139"/>
+                                    </p:animMotion>
+                                  </p:childTnLst>
+                                </p:cTn>
+                              </p:par>
+                              <p:par>
+                                <p:cTn id="65" presetID="10" presetClass="exit" presetSubtype="0" fill="hold" nodeType="withEffect">
+                                  <p:stCondLst>
+                                    <p:cond delay="0"/>
+                                  </p:stCondLst>
+                                  <p:childTnLst>
+                                    <p:animEffect transition="out" filter="fade">
+                                      <p:cBhvr>
+                                        <p:cTn id="66" dur="500"/>
+                                        <p:tgtEl>
+                                          <p:spTgt spid="13"/>
+                                        </p:tgtEl>
+                                      </p:cBhvr>
+                                    </p:animEffect>
+                                    <p:set>
+                                      <p:cBhvr>
+                                        <p:cTn id="67" dur="1" fill="hold">
+                                          <p:stCondLst>
+                                            <p:cond delay="499"/>
+                                          </p:stCondLst>
+                                        </p:cTn>
+                                        <p:tgtEl>
+                                          <p:spTgt spid="13"/>
+                                        </p:tgtEl>
+                                        <p:attrNameLst>
+                                          <p:attrName>style.visibility</p:attrName>
+                                        </p:attrNameLst>
+                                      </p:cBhvr>
+                                      <p:to>
+                                        <p:strVal val="hidden"/>
+                                      </p:to>
+                                    </p:set>
+                                  </p:childTnLst>
+                                </p:cTn>
+                              </p:par>
+                              <p:par>
+                                <p:cTn id="68" presetID="1" presetClass="entr" presetSubtype="0" fill="hold" nodeType="withEffect">
+                                  <p:stCondLst>
+                                    <p:cond delay="0"/>
+                                  </p:stCondLst>
+                                  <p:childTnLst>
+                                    <p:set>
+                                      <p:cBhvr>
+                                        <p:cTn id="69" dur="1" fill="hold">
+                                          <p:stCondLst>
+                                            <p:cond delay="0"/>
+                                          </p:stCondLst>
+                                        </p:cTn>
+                                        <p:tgtEl>
+                                          <p:spTgt spid="17"/>
+                                        </p:tgtEl>
+                                        <p:attrNameLst>
+                                          <p:attrName>style.visibility</p:attrName>
+                                        </p:attrNameLst>
+                                      </p:cBhvr>
+                                      <p:to>
+                                        <p:strVal val="visible"/>
+                                      </p:to>
+                                    </p:set>
+                                  </p:childTnLst>
+                                </p:cTn>
+                              </p:par>
+                              <p:par>
+                                <p:cTn id="70" presetID="1" presetClass="entr" presetSubtype="0" fill="hold" grpId="0" nodeType="withEffect">
+                                  <p:stCondLst>
+                                    <p:cond delay="0"/>
+                                  </p:stCondLst>
+                                  <p:childTnLst>
+                                    <p:set>
+                                      <p:cBhvr>
+                                        <p:cTn id="71" dur="1" fill="hold">
+                                          <p:stCondLst>
+                                            <p:cond delay="0"/>
+                                          </p:stCondLst>
+                                        </p:cTn>
+                                        <p:tgtEl>
+                                          <p:spTgt spid="18"/>
+                                        </p:tgtEl>
+                                        <p:attrNameLst>
+                                          <p:attrName>style.visibility</p:attrName>
+                                        </p:attrNameLst>
+                                      </p:cBhvr>
+                                      <p:to>
+                                        <p:strVal val="visible"/>
+                                      </p:to>
+                                    </p:set>
+                                  </p:childTnLst>
+                                </p:cTn>
+                              </p:par>
+                              <p:par>
+                                <p:cTn id="72" presetID="1" presetClass="exit" presetSubtype="0" fill="hold" grpId="1" nodeType="withEffect">
+                                  <p:stCondLst>
+                                    <p:cond delay="0"/>
+                                  </p:stCondLst>
+                                  <p:childTnLst>
+                                    <p:set>
+                                      <p:cBhvr>
+                                        <p:cTn id="73" dur="1" fill="hold">
+                                          <p:stCondLst>
+                                            <p:cond delay="0"/>
+                                          </p:stCondLst>
+                                        </p:cTn>
+                                        <p:tgtEl>
+                                          <p:spTgt spid="15"/>
+                                        </p:tgtEl>
+                                        <p:attrNameLst>
+                                          <p:attrName>style.visibility</p:attrName>
+                                        </p:attrNameLst>
+                                      </p:cBhvr>
+                                      <p:to>
+                                        <p:strVal val="hidden"/>
+                                      </p:to>
+                                    </p:set>
+                                  </p:childTnLst>
+                                </p:cTn>
+                              </p:par>
+                              <p:par>
+                                <p:cTn id="74" presetID="10" presetClass="exit" presetSubtype="0" fill="hold" grpId="1" nodeType="withEffect">
+                                  <p:stCondLst>
+                                    <p:cond delay="0"/>
+                                  </p:stCondLst>
+                                  <p:childTnLst>
+                                    <p:animEffect transition="out" filter="fade">
+                                      <p:cBhvr>
+                                        <p:cTn id="75" dur="500"/>
+                                        <p:tgtEl>
+                                          <p:spTgt spid="19"/>
+                                        </p:tgtEl>
+                                      </p:cBhvr>
+                                    </p:animEffect>
+                                    <p:set>
+                                      <p:cBhvr>
+                                        <p:cTn id="76" dur="1" fill="hold">
+                                          <p:stCondLst>
+                                            <p:cond delay="499"/>
+                                          </p:stCondLst>
+                                        </p:cTn>
+                                        <p:tgtEl>
+                                          <p:spTgt spid="19"/>
+                                        </p:tgtEl>
+                                        <p:attrNameLst>
+                                          <p:attrName>style.visibility</p:attrName>
+                                        </p:attrNameLst>
+                                      </p:cBhvr>
+                                      <p:to>
+                                        <p:strVal val="hidden"/>
+                                      </p:to>
+                                    </p:set>
+                                  </p:childTnLst>
+                                </p:cTn>
+                              </p:par>
+                            </p:childTnLst>
+                          </p:cTn>
+                        </p:par>
+                      </p:childTnLst>
+                    </p:cTn>
+                  </p:par>
+                </p:childTnLst>
+              </p:cTn>
+              <p:prevCondLst>
+                <p:cond evt="onPrev" delay="0">
+                  <p:tgtEl>
+                    <p:sldTgt/>
+                  </p:tgtEl>
+                </p:cond>
+              </p:prevCondLst>
+              <p:nextCondLst>
+                <p:cond evt="onNext" delay="0">
+                  <p:tgtEl>
+                    <p:sldTgt/>
+                  </p:tgtEl>
+                </p:cond>
+              </p:nextCondLst>
+            </p:seq>
+          </p:childTnLst>
+        </p:cTn>
+      </p:par>
+    </p:tnLst>
+    <p:bldLst>
+      <p:bldP spid="3" grpId="0"/>
+      <p:bldP spid="8" grpId="0" animBg="1"/>
+      <p:bldP spid="8" grpId="1" animBg="1"/>
+      <p:bldP spid="10" grpId="0"/>
+      <p:bldP spid="11" grpId="0"/>
+      <p:bldP spid="11" grpId="1"/>
+      <p:bldP spid="14" grpId="0"/>
+      <p:bldP spid="14" grpId="1"/>
+      <p:bldP spid="15" grpId="0"/>
+      <p:bldP spid="15" grpId="1"/>
+      <p:bldP spid="18" grpId="0"/>
+      <p:bldP spid="19" grpId="0"/>
+      <p:bldP spid="19" grpId="1"/>
+    </p:bldLst>
+  </p:timing>
+</p:sld>
+</file>
+
+<file path=ppt/slides/slide4.xml><?xml version="1.0" encoding="utf-8"?>
+<p:sld xmlns:a="http://schemas.openxmlformats.org/drawingml/2006/main" xmlns:r="http://schemas.openxmlformats.org/officeDocument/2006/relationships" xmlns:p="http://schemas.openxmlformats.org/presentationml/2006/main">
+  <p:cSld>
+    <p:spTree>
+      <p:nvGrpSpPr>
+        <p:cNvPr id="1" name=""/>
+        <p:cNvGrpSpPr/>
+        <p:nvPr/>
+      </p:nvGrpSpPr>
+      <p:grpSpPr>
+        <a:xfrm>
+          <a:off x="0" y="0"/>
+          <a:ext cx="0" cy="0"/>
+          <a:chOff x="0" y="0"/>
+          <a:chExt cx="0" cy="0"/>
+        </a:xfrm>
+      </p:grpSpPr>
+      <p:graphicFrame>
+        <p:nvGraphicFramePr>
+          <p:cNvPr id="4" name="표 4">
+            <a:extLst>
+              <a:ext uri="{FF2B5EF4-FFF2-40B4-BE49-F238E27FC236}">
+                <a16:creationId xmlns:a16="http://schemas.microsoft.com/office/drawing/2014/main" id="{16227336-41DD-4FE2-80B3-E9141EE15411}"/>
+              </a:ext>
+            </a:extLst>
+          </p:cNvPr>
+          <p:cNvGraphicFramePr>
+            <a:graphicFrameLocks noGrp="1"/>
+          </p:cNvGraphicFramePr>
+          <p:nvPr>
+            <p:extLst>
+              <p:ext uri="{D42A27DB-BD31-4B8C-83A1-F6EECF244321}">
+                <p14:modId xmlns:p14="http://schemas.microsoft.com/office/powerpoint/2010/main" val="525217040"/>
+              </p:ext>
+            </p:extLst>
+          </p:nvPr>
+        </p:nvGraphicFramePr>
+        <p:xfrm>
+          <a:off x="250370" y="1937657"/>
+          <a:ext cx="11636832" cy="2024743"/>
+        </p:xfrm>
+        <a:graphic>
+          <a:graphicData uri="http://schemas.openxmlformats.org/drawingml/2006/table">
+            <a:tbl>
+              <a:tblPr firstRow="1" bandRow="1">
+                <a:tableStyleId>{5C22544A-7EE6-4342-B048-85BDC9FD1C3A}</a:tableStyleId>
+              </a:tblPr>
+              <a:tblGrid>
+                <a:gridCol w="1939472">
+                  <a:extLst>
+                    <a:ext uri="{9D8B030D-6E8A-4147-A177-3AD203B41FA5}">
+                      <a16:colId xmlns:a16="http://schemas.microsoft.com/office/drawing/2014/main" val="1653098086"/>
+                    </a:ext>
+                  </a:extLst>
+                </a:gridCol>
+                <a:gridCol w="1939472">
+                  <a:extLst>
+                    <a:ext uri="{9D8B030D-6E8A-4147-A177-3AD203B41FA5}">
+                      <a16:colId xmlns:a16="http://schemas.microsoft.com/office/drawing/2014/main" val="4009950614"/>
+                    </a:ext>
+                  </a:extLst>
+                </a:gridCol>
+                <a:gridCol w="1939472">
+                  <a:extLst>
+                    <a:ext uri="{9D8B030D-6E8A-4147-A177-3AD203B41FA5}">
+                      <a16:colId xmlns:a16="http://schemas.microsoft.com/office/drawing/2014/main" val="3049846432"/>
+                    </a:ext>
+                  </a:extLst>
+                </a:gridCol>
+                <a:gridCol w="1939472">
+                  <a:extLst>
+                    <a:ext uri="{9D8B030D-6E8A-4147-A177-3AD203B41FA5}">
+                      <a16:colId xmlns:a16="http://schemas.microsoft.com/office/drawing/2014/main" val="1955210884"/>
+                    </a:ext>
+                  </a:extLst>
+                </a:gridCol>
+                <a:gridCol w="1939472">
+                  <a:extLst>
+                    <a:ext uri="{9D8B030D-6E8A-4147-A177-3AD203B41FA5}">
+                      <a16:colId xmlns:a16="http://schemas.microsoft.com/office/drawing/2014/main" val="1897946193"/>
+                    </a:ext>
+                  </a:extLst>
+                </a:gridCol>
+                <a:gridCol w="1939472">
+                  <a:extLst>
+                    <a:ext uri="{9D8B030D-6E8A-4147-A177-3AD203B41FA5}">
+                      <a16:colId xmlns:a16="http://schemas.microsoft.com/office/drawing/2014/main" val="2706033229"/>
+                    </a:ext>
+                  </a:extLst>
+                </a:gridCol>
+              </a:tblGrid>
+              <a:tr h="2024743">
+                <a:tc>
+                  <a:txBody>
+                    <a:bodyPr/>
+                    <a:lstStyle/>
+                    <a:p>
+                      <a:pPr algn="ctr" latinLnBrk="1"/>
+                      <a:r>
+                        <a:rPr lang="en-US" altLang="ko-KR" sz="7000" dirty="0">
+                          <a:latin typeface="a고딕14" panose="02020600000000000000" pitchFamily="18" charset="-127"/>
+                          <a:ea typeface="a고딕14" panose="02020600000000000000" pitchFamily="18" charset="-127"/>
+                        </a:rPr>
+                        <a:t>1</a:t>
+                      </a:r>
+                      <a:endParaRPr lang="ko-KR" altLang="en-US" sz="7000" dirty="0">
+                        <a:latin typeface="a고딕14" panose="02020600000000000000" pitchFamily="18" charset="-127"/>
+                        <a:ea typeface="a고딕14" panose="02020600000000000000" pitchFamily="18" charset="-127"/>
+                      </a:endParaRPr>
+                    </a:p>
+                  </a:txBody>
+                  <a:tcPr anchor="ctr"/>
+                </a:tc>
+                <a:tc>
+                  <a:txBody>
+                    <a:bodyPr/>
+                    <a:lstStyle/>
+                    <a:p>
+                      <a:pPr algn="ctr" latinLnBrk="1"/>
+                      <a:r>
+                        <a:rPr lang="en-US" altLang="ko-KR" sz="7000" dirty="0">
+                          <a:latin typeface="a고딕14" panose="02020600000000000000" pitchFamily="18" charset="-127"/>
+                          <a:ea typeface="a고딕14" panose="02020600000000000000" pitchFamily="18" charset="-127"/>
+                        </a:rPr>
+                        <a:t>1</a:t>
+                      </a:r>
+                      <a:endParaRPr lang="ko-KR" altLang="en-US" sz="7000" dirty="0">
+                        <a:latin typeface="a고딕14" panose="02020600000000000000" pitchFamily="18" charset="-127"/>
+                        <a:ea typeface="a고딕14" panose="02020600000000000000" pitchFamily="18" charset="-127"/>
+                      </a:endParaRPr>
+                    </a:p>
+                  </a:txBody>
+                  <a:tcPr anchor="ctr"/>
+                </a:tc>
+                <a:tc>
+                  <a:txBody>
+                    <a:bodyPr/>
+                    <a:lstStyle/>
+                    <a:p>
+                      <a:pPr algn="ctr" latinLnBrk="1"/>
+                      <a:r>
+                        <a:rPr lang="en-US" altLang="ko-KR" sz="7000" dirty="0">
+                          <a:latin typeface="a고딕14" panose="02020600000000000000" pitchFamily="18" charset="-127"/>
+                          <a:ea typeface="a고딕14" panose="02020600000000000000" pitchFamily="18" charset="-127"/>
+                        </a:rPr>
+                        <a:t>9</a:t>
+                      </a:r>
+                      <a:endParaRPr lang="ko-KR" altLang="en-US" sz="7000" dirty="0">
+                        <a:latin typeface="a고딕14" panose="02020600000000000000" pitchFamily="18" charset="-127"/>
+                        <a:ea typeface="a고딕14" panose="02020600000000000000" pitchFamily="18" charset="-127"/>
+                      </a:endParaRPr>
+                    </a:p>
+                  </a:txBody>
+                  <a:tcPr anchor="ctr"/>
+                </a:tc>
+                <a:tc>
+                  <a:txBody>
+                    <a:bodyPr/>
+                    <a:lstStyle/>
+                    <a:p>
+                      <a:pPr algn="ctr" latinLnBrk="1"/>
+                      <a:r>
+                        <a:rPr lang="en-US" altLang="ko-KR" sz="7000" dirty="0">
+                          <a:latin typeface="a고딕14" panose="02020600000000000000" pitchFamily="18" charset="-127"/>
+                          <a:ea typeface="a고딕14" panose="02020600000000000000" pitchFamily="18" charset="-127"/>
+                        </a:rPr>
+                        <a:t>1</a:t>
+                      </a:r>
+                      <a:endParaRPr lang="ko-KR" altLang="en-US" sz="7000" dirty="0">
+                        <a:latin typeface="a고딕14" panose="02020600000000000000" pitchFamily="18" charset="-127"/>
+                        <a:ea typeface="a고딕14" panose="02020600000000000000" pitchFamily="18" charset="-127"/>
+                      </a:endParaRPr>
+                    </a:p>
+                  </a:txBody>
+                  <a:tcPr anchor="ctr"/>
+                </a:tc>
+                <a:tc>
+                  <a:txBody>
+                    <a:bodyPr/>
+                    <a:lstStyle/>
+                    <a:p>
+                      <a:pPr algn="ctr" latinLnBrk="1"/>
+                      <a:r>
+                        <a:rPr lang="en-US" altLang="ko-KR" sz="7000" dirty="0">
+                          <a:latin typeface="a고딕14" panose="02020600000000000000" pitchFamily="18" charset="-127"/>
+                          <a:ea typeface="a고딕14" panose="02020600000000000000" pitchFamily="18" charset="-127"/>
+                        </a:rPr>
+                        <a:t>3</a:t>
+                      </a:r>
+                      <a:endParaRPr lang="ko-KR" altLang="en-US" sz="7000" dirty="0">
+                        <a:latin typeface="a고딕14" panose="02020600000000000000" pitchFamily="18" charset="-127"/>
+                        <a:ea typeface="a고딕14" panose="02020600000000000000" pitchFamily="18" charset="-127"/>
+                      </a:endParaRPr>
+                    </a:p>
+                  </a:txBody>
+                  <a:tcPr anchor="ctr"/>
+                </a:tc>
+                <a:tc>
+                  <a:txBody>
+                    <a:bodyPr/>
+                    <a:lstStyle/>
+                    <a:p>
+                      <a:pPr algn="ctr" latinLnBrk="1"/>
+                      <a:r>
+                        <a:rPr lang="en-US" altLang="ko-KR" sz="7000" dirty="0">
+                          <a:latin typeface="a고딕14" panose="02020600000000000000" pitchFamily="18" charset="-127"/>
+                          <a:ea typeface="a고딕14" panose="02020600000000000000" pitchFamily="18" charset="-127"/>
+                        </a:rPr>
+                        <a:t>1</a:t>
+                      </a:r>
+                      <a:endParaRPr lang="ko-KR" altLang="en-US" sz="7000" dirty="0">
+                        <a:latin typeface="a고딕14" panose="02020600000000000000" pitchFamily="18" charset="-127"/>
+                        <a:ea typeface="a고딕14" panose="02020600000000000000" pitchFamily="18" charset="-127"/>
+                      </a:endParaRPr>
+                    </a:p>
+                  </a:txBody>
+                  <a:tcPr anchor="ctr"/>
+                </a:tc>
+                <a:extLst>
+                  <a:ext uri="{0D108BD9-81ED-4DB2-BD59-A6C34878D82A}">
+                    <a16:rowId xmlns:a16="http://schemas.microsoft.com/office/drawing/2014/main" val="3503805624"/>
+                  </a:ext>
+                </a:extLst>
+              </a:tr>
+            </a:tbl>
+          </a:graphicData>
+        </a:graphic>
+      </p:graphicFrame>
+      <p:sp>
+        <p:nvSpPr>
+          <p:cNvPr id="5" name="TextBox 4">
+            <a:extLst>
+              <a:ext uri="{FF2B5EF4-FFF2-40B4-BE49-F238E27FC236}">
+                <a16:creationId xmlns:a16="http://schemas.microsoft.com/office/drawing/2014/main" id="{A4777EE2-B741-440F-BB43-1CBD953262C2}"/>
+              </a:ext>
+            </a:extLst>
+          </p:cNvPr>
+          <p:cNvSpPr txBox="1"/>
+          <p:nvPr/>
+        </p:nvSpPr>
+        <p:spPr>
+          <a:xfrm>
+            <a:off x="1012874" y="559136"/>
+            <a:ext cx="4740812" cy="707886"/>
+          </a:xfrm>
+          <a:prstGeom prst="rect">
+            <a:avLst/>
+          </a:prstGeom>
+          <a:noFill/>
+        </p:spPr>
+        <p:txBody>
+          <a:bodyPr wrap="square" rtlCol="0">
+            <a:spAutoFit/>
+          </a:bodyPr>
+          <a:lstStyle/>
+          <a:p>
+            <a:r>
+              <a:rPr lang="en-US" altLang="ko-KR" sz="4000" dirty="0">
+                <a:latin typeface="a고딕12" panose="02020600000000000000" pitchFamily="18" charset="-127"/>
+                <a:ea typeface="a고딕12" panose="02020600000000000000" pitchFamily="18" charset="-127"/>
+              </a:rPr>
+              <a:t>Case: M = 4</a:t>
+            </a:r>
+            <a:endParaRPr lang="ko-KR" altLang="en-US" sz="4000" dirty="0">
+              <a:latin typeface="a고딕12" panose="02020600000000000000" pitchFamily="18" charset="-127"/>
+              <a:ea typeface="a고딕12" panose="02020600000000000000" pitchFamily="18" charset="-127"/>
+            </a:endParaRPr>
+          </a:p>
+        </p:txBody>
+      </p:sp>
+      <p:grpSp>
+        <p:nvGrpSpPr>
+          <p:cNvPr id="6" name="그룹 5">
+            <a:extLst>
+              <a:ext uri="{FF2B5EF4-FFF2-40B4-BE49-F238E27FC236}">
+                <a16:creationId xmlns:a16="http://schemas.microsoft.com/office/drawing/2014/main" id="{8768489C-D92F-4D01-BBEE-8FE07D7C541C}"/>
+              </a:ext>
+            </a:extLst>
+          </p:cNvPr>
+          <p:cNvGrpSpPr/>
+          <p:nvPr/>
+        </p:nvGrpSpPr>
+        <p:grpSpPr>
+          <a:xfrm>
+            <a:off x="4300443" y="4276745"/>
+            <a:ext cx="1611086" cy="1621189"/>
+            <a:chOff x="342900" y="4452257"/>
+            <a:chExt cx="1611086" cy="1621189"/>
+          </a:xfrm>
+        </p:grpSpPr>
+        <p:sp>
+          <p:nvSpPr>
+            <p:cNvPr id="7" name="화살표: 위쪽 6">
+              <a:extLst>
+                <a:ext uri="{FF2B5EF4-FFF2-40B4-BE49-F238E27FC236}">
+                  <a16:creationId xmlns:a16="http://schemas.microsoft.com/office/drawing/2014/main" id="{932522DB-75DB-4C35-95D9-E87615FDACEF}"/>
+                </a:ext>
+              </a:extLst>
+            </p:cNvPr>
+            <p:cNvSpPr/>
+            <p:nvPr/>
+          </p:nvSpPr>
+          <p:spPr>
+            <a:xfrm>
+              <a:off x="642257" y="4452257"/>
+              <a:ext cx="1012372" cy="1251857"/>
+            </a:xfrm>
+            <a:prstGeom prst="upArrow">
+              <a:avLst/>
+            </a:prstGeom>
+          </p:spPr>
+          <p:style>
+            <a:lnRef idx="2">
+              <a:schemeClr val="accent1">
+                <a:shade val="50000"/>
+              </a:schemeClr>
+            </a:lnRef>
+            <a:fillRef idx="1">
+              <a:schemeClr val="accent1"/>
+            </a:fillRef>
+            <a:effectRef idx="0">
+              <a:schemeClr val="accent1"/>
+            </a:effectRef>
+            <a:fontRef idx="minor">
+              <a:schemeClr val="lt1"/>
+            </a:fontRef>
+          </p:style>
+          <p:txBody>
+            <a:bodyPr rtlCol="0" anchor="ctr"/>
+            <a:lstStyle/>
+            <a:p>
+              <a:pPr algn="ctr"/>
+              <a:endParaRPr lang="ko-KR" altLang="en-US">
+                <a:latin typeface="a고딕12" panose="02020600000000000000" pitchFamily="18" charset="-127"/>
+                <a:ea typeface="a고딕12" panose="02020600000000000000" pitchFamily="18" charset="-127"/>
+              </a:endParaRPr>
+            </a:p>
+          </p:txBody>
+        </p:sp>
+        <p:sp>
+          <p:nvSpPr>
+            <p:cNvPr id="8" name="TextBox 7">
+              <a:extLst>
+                <a:ext uri="{FF2B5EF4-FFF2-40B4-BE49-F238E27FC236}">
+                  <a16:creationId xmlns:a16="http://schemas.microsoft.com/office/drawing/2014/main" id="{53831BCA-699D-4774-8AA2-7635412EF293}"/>
+                </a:ext>
+              </a:extLst>
+            </p:cNvPr>
+            <p:cNvSpPr txBox="1"/>
+            <p:nvPr/>
+          </p:nvSpPr>
+          <p:spPr>
+            <a:xfrm>
+              <a:off x="342900" y="5704114"/>
+              <a:ext cx="1611086" cy="369332"/>
+            </a:xfrm>
+            <a:prstGeom prst="rect">
+              <a:avLst/>
+            </a:prstGeom>
+            <a:noFill/>
+          </p:spPr>
+          <p:txBody>
+            <a:bodyPr wrap="square" rtlCol="0">
+              <a:spAutoFit/>
+            </a:bodyPr>
+            <a:lstStyle/>
+            <a:p>
+              <a:pPr algn="ctr"/>
+              <a:r>
+                <a:rPr lang="en-US" altLang="ko-KR" dirty="0">
+                  <a:latin typeface="a고딕12" panose="02020600000000000000" pitchFamily="18" charset="-127"/>
+                  <a:ea typeface="a고딕12" panose="02020600000000000000" pitchFamily="18" charset="-127"/>
+                </a:rPr>
+                <a:t>index</a:t>
+              </a:r>
+              <a:endParaRPr lang="ko-KR" altLang="en-US" dirty="0">
+                <a:latin typeface="a고딕12" panose="02020600000000000000" pitchFamily="18" charset="-127"/>
+                <a:ea typeface="a고딕12" panose="02020600000000000000" pitchFamily="18" charset="-127"/>
+              </a:endParaRPr>
+            </a:p>
+          </p:txBody>
+        </p:sp>
+      </p:grpSp>
+      <p:sp>
+        <p:nvSpPr>
+          <p:cNvPr id="9" name="TextBox 8">
+            <a:extLst>
+              <a:ext uri="{FF2B5EF4-FFF2-40B4-BE49-F238E27FC236}">
+                <a16:creationId xmlns:a16="http://schemas.microsoft.com/office/drawing/2014/main" id="{0708AB2C-6839-4A34-AEAE-177669E83DEC}"/>
+              </a:ext>
+            </a:extLst>
+          </p:cNvPr>
+          <p:cNvSpPr txBox="1"/>
+          <p:nvPr/>
+        </p:nvSpPr>
+        <p:spPr>
+          <a:xfrm>
+            <a:off x="3808409" y="6072573"/>
+            <a:ext cx="4206240" cy="707886"/>
+          </a:xfrm>
+          <a:prstGeom prst="rect">
+            <a:avLst/>
+          </a:prstGeom>
+          <a:noFill/>
+        </p:spPr>
+        <p:txBody>
+          <a:bodyPr wrap="square" rtlCol="0">
+            <a:spAutoFit/>
+          </a:bodyPr>
+          <a:lstStyle/>
+          <a:p>
+            <a:r>
+              <a:rPr lang="en-US" altLang="ko-KR" sz="4000" dirty="0">
+                <a:latin typeface="a고딕12" panose="02020600000000000000" pitchFamily="18" charset="-127"/>
+                <a:ea typeface="a고딕12" panose="02020600000000000000" pitchFamily="18" charset="-127"/>
+              </a:rPr>
+              <a:t>index&lt;M =&gt; M--</a:t>
+            </a:r>
+            <a:endParaRPr lang="ko-KR" altLang="en-US" sz="4000" dirty="0">
+              <a:latin typeface="a고딕12" panose="02020600000000000000" pitchFamily="18" charset="-127"/>
+              <a:ea typeface="a고딕12" panose="02020600000000000000" pitchFamily="18" charset="-127"/>
+            </a:endParaRPr>
+          </a:p>
+        </p:txBody>
+      </p:sp>
+    </p:spTree>
+    <p:extLst>
+      <p:ext uri="{BB962C8B-B14F-4D97-AF65-F5344CB8AC3E}">
+        <p14:creationId xmlns:p14="http://schemas.microsoft.com/office/powerpoint/2010/main" val="2271292659"/>
+      </p:ext>
+    </p:extLst>
+  </p:cSld>
+  <p:clrMapOvr>
+    <a:masterClrMapping/>
+  </p:clrMapOvr>
+</p:sld>
+</file>
+
+<file path=ppt/slides/slide5.xml><?xml version="1.0" encoding="utf-8"?>
+<p:sld xmlns:a="http://schemas.openxmlformats.org/drawingml/2006/main" xmlns:r="http://schemas.openxmlformats.org/officeDocument/2006/relationships" xmlns:p="http://schemas.openxmlformats.org/presentationml/2006/main">
+  <p:cSld>
+    <p:spTree>
+      <p:nvGrpSpPr>
+        <p:cNvPr id="1" name=""/>
+        <p:cNvGrpSpPr/>
+        <p:nvPr/>
+      </p:nvGrpSpPr>
+      <p:grpSpPr>
+        <a:xfrm>
+          <a:off x="0" y="0"/>
+          <a:ext cx="0" cy="0"/>
+          <a:chOff x="0" y="0"/>
+          <a:chExt cx="0" cy="0"/>
+        </a:xfrm>
+      </p:grpSpPr>
+      <p:graphicFrame>
+        <p:nvGraphicFramePr>
+          <p:cNvPr id="4" name="표 4">
+            <a:extLst>
+              <a:ext uri="{FF2B5EF4-FFF2-40B4-BE49-F238E27FC236}">
+                <a16:creationId xmlns:a16="http://schemas.microsoft.com/office/drawing/2014/main" id="{16227336-41DD-4FE2-80B3-E9141EE15411}"/>
+              </a:ext>
+            </a:extLst>
+          </p:cNvPr>
+          <p:cNvGraphicFramePr>
+            <a:graphicFrameLocks noGrp="1"/>
+          </p:cNvGraphicFramePr>
+          <p:nvPr>
+            <p:extLst>
+              <p:ext uri="{D42A27DB-BD31-4B8C-83A1-F6EECF244321}">
+                <p14:modId xmlns:p14="http://schemas.microsoft.com/office/powerpoint/2010/main" val="2129804506"/>
+              </p:ext>
+            </p:extLst>
+          </p:nvPr>
+        </p:nvGraphicFramePr>
+        <p:xfrm>
+          <a:off x="250370" y="1937657"/>
+          <a:ext cx="9697360" cy="2024743"/>
+        </p:xfrm>
+        <a:graphic>
+          <a:graphicData uri="http://schemas.openxmlformats.org/drawingml/2006/table">
+            <a:tbl>
+              <a:tblPr firstRow="1" bandRow="1">
+                <a:tableStyleId>{5C22544A-7EE6-4342-B048-85BDC9FD1C3A}</a:tableStyleId>
+              </a:tblPr>
+              <a:tblGrid>
+                <a:gridCol w="1939472">
+                  <a:extLst>
+                    <a:ext uri="{9D8B030D-6E8A-4147-A177-3AD203B41FA5}">
+                      <a16:colId xmlns:a16="http://schemas.microsoft.com/office/drawing/2014/main" val="1653098086"/>
+                    </a:ext>
+                  </a:extLst>
+                </a:gridCol>
+                <a:gridCol w="1939472">
+                  <a:extLst>
+                    <a:ext uri="{9D8B030D-6E8A-4147-A177-3AD203B41FA5}">
+                      <a16:colId xmlns:a16="http://schemas.microsoft.com/office/drawing/2014/main" val="4009950614"/>
+                    </a:ext>
+                  </a:extLst>
+                </a:gridCol>
+                <a:gridCol w="1939472">
+                  <a:extLst>
+                    <a:ext uri="{9D8B030D-6E8A-4147-A177-3AD203B41FA5}">
+                      <a16:colId xmlns:a16="http://schemas.microsoft.com/office/drawing/2014/main" val="1955210884"/>
+                    </a:ext>
+                  </a:extLst>
+                </a:gridCol>
+                <a:gridCol w="1939472">
+                  <a:extLst>
+                    <a:ext uri="{9D8B030D-6E8A-4147-A177-3AD203B41FA5}">
+                      <a16:colId xmlns:a16="http://schemas.microsoft.com/office/drawing/2014/main" val="1897946193"/>
+                    </a:ext>
+                  </a:extLst>
+                </a:gridCol>
+                <a:gridCol w="1939472">
+                  <a:extLst>
+                    <a:ext uri="{9D8B030D-6E8A-4147-A177-3AD203B41FA5}">
+                      <a16:colId xmlns:a16="http://schemas.microsoft.com/office/drawing/2014/main" val="2706033229"/>
+                    </a:ext>
+                  </a:extLst>
+                </a:gridCol>
+              </a:tblGrid>
+              <a:tr h="2024743">
+                <a:tc>
+                  <a:txBody>
+                    <a:bodyPr/>
+                    <a:lstStyle/>
+                    <a:p>
+                      <a:pPr algn="ctr" latinLnBrk="1"/>
+                      <a:r>
+                        <a:rPr lang="en-US" altLang="ko-KR" sz="7000" dirty="0">
+                          <a:latin typeface="a고딕14" panose="02020600000000000000" pitchFamily="18" charset="-127"/>
+                          <a:ea typeface="a고딕14" panose="02020600000000000000" pitchFamily="18" charset="-127"/>
+                        </a:rPr>
+                        <a:t>1</a:t>
+                      </a:r>
+                      <a:endParaRPr lang="ko-KR" altLang="en-US" sz="7000" dirty="0">
+                        <a:latin typeface="a고딕14" panose="02020600000000000000" pitchFamily="18" charset="-127"/>
+                        <a:ea typeface="a고딕14" panose="02020600000000000000" pitchFamily="18" charset="-127"/>
+                      </a:endParaRPr>
+                    </a:p>
+                  </a:txBody>
+                  <a:tcPr anchor="ctr"/>
+                </a:tc>
+                <a:tc>
+                  <a:txBody>
+                    <a:bodyPr/>
+                    <a:lstStyle/>
+                    <a:p>
+                      <a:pPr algn="ctr" latinLnBrk="1"/>
+                      <a:r>
+                        <a:rPr lang="en-US" altLang="ko-KR" sz="7000" dirty="0">
+                          <a:latin typeface="a고딕14" panose="02020600000000000000" pitchFamily="18" charset="-127"/>
+                          <a:ea typeface="a고딕14" panose="02020600000000000000" pitchFamily="18" charset="-127"/>
+                        </a:rPr>
+                        <a:t>1</a:t>
+                      </a:r>
+                      <a:endParaRPr lang="ko-KR" altLang="en-US" sz="7000" dirty="0">
+                        <a:latin typeface="a고딕14" panose="02020600000000000000" pitchFamily="18" charset="-127"/>
+                        <a:ea typeface="a고딕14" panose="02020600000000000000" pitchFamily="18" charset="-127"/>
+                      </a:endParaRPr>
+                    </a:p>
+                  </a:txBody>
+                  <a:tcPr anchor="ctr"/>
+                </a:tc>
+                <a:tc>
+                  <a:txBody>
+                    <a:bodyPr/>
+                    <a:lstStyle/>
+                    <a:p>
+                      <a:pPr algn="ctr" latinLnBrk="1"/>
+                      <a:r>
+                        <a:rPr lang="en-US" altLang="ko-KR" sz="7000" dirty="0">
+                          <a:latin typeface="a고딕14" panose="02020600000000000000" pitchFamily="18" charset="-127"/>
+                          <a:ea typeface="a고딕14" panose="02020600000000000000" pitchFamily="18" charset="-127"/>
+                        </a:rPr>
+                        <a:t>1</a:t>
+                      </a:r>
+                      <a:endParaRPr lang="ko-KR" altLang="en-US" sz="7000" dirty="0">
+                        <a:latin typeface="a고딕14" panose="02020600000000000000" pitchFamily="18" charset="-127"/>
+                        <a:ea typeface="a고딕14" panose="02020600000000000000" pitchFamily="18" charset="-127"/>
+                      </a:endParaRPr>
+                    </a:p>
+                  </a:txBody>
+                  <a:tcPr anchor="ctr"/>
+                </a:tc>
+                <a:tc>
+                  <a:txBody>
+                    <a:bodyPr/>
+                    <a:lstStyle/>
+                    <a:p>
+                      <a:pPr algn="ctr" latinLnBrk="1"/>
+                      <a:r>
+                        <a:rPr lang="en-US" altLang="ko-KR" sz="7000" dirty="0">
+                          <a:latin typeface="a고딕14" panose="02020600000000000000" pitchFamily="18" charset="-127"/>
+                          <a:ea typeface="a고딕14" panose="02020600000000000000" pitchFamily="18" charset="-127"/>
+                        </a:rPr>
+                        <a:t>3</a:t>
+                      </a:r>
+                      <a:endParaRPr lang="ko-KR" altLang="en-US" sz="7000" dirty="0">
+                        <a:latin typeface="a고딕14" panose="02020600000000000000" pitchFamily="18" charset="-127"/>
+                        <a:ea typeface="a고딕14" panose="02020600000000000000" pitchFamily="18" charset="-127"/>
+                      </a:endParaRPr>
+                    </a:p>
+                  </a:txBody>
+                  <a:tcPr anchor="ctr"/>
+                </a:tc>
+                <a:tc>
+                  <a:txBody>
+                    <a:bodyPr/>
+                    <a:lstStyle/>
+                    <a:p>
+                      <a:pPr algn="ctr" latinLnBrk="1"/>
+                      <a:r>
+                        <a:rPr lang="en-US" altLang="ko-KR" sz="7000" dirty="0">
+                          <a:latin typeface="a고딕14" panose="02020600000000000000" pitchFamily="18" charset="-127"/>
+                          <a:ea typeface="a고딕14" panose="02020600000000000000" pitchFamily="18" charset="-127"/>
+                        </a:rPr>
+                        <a:t>1</a:t>
+                      </a:r>
+                      <a:endParaRPr lang="ko-KR" altLang="en-US" sz="7000" dirty="0">
+                        <a:latin typeface="a고딕14" panose="02020600000000000000" pitchFamily="18" charset="-127"/>
+                        <a:ea typeface="a고딕14" panose="02020600000000000000" pitchFamily="18" charset="-127"/>
+                      </a:endParaRPr>
+                    </a:p>
+                  </a:txBody>
+                  <a:tcPr anchor="ctr"/>
+                </a:tc>
+                <a:extLst>
+                  <a:ext uri="{0D108BD9-81ED-4DB2-BD59-A6C34878D82A}">
+                    <a16:rowId xmlns:a16="http://schemas.microsoft.com/office/drawing/2014/main" val="3503805624"/>
+                  </a:ext>
+                </a:extLst>
+              </a:tr>
+            </a:tbl>
+          </a:graphicData>
+        </a:graphic>
+      </p:graphicFrame>
+      <p:grpSp>
+        <p:nvGrpSpPr>
+          <p:cNvPr id="6" name="그룹 5">
+            <a:extLst>
+              <a:ext uri="{FF2B5EF4-FFF2-40B4-BE49-F238E27FC236}">
+                <a16:creationId xmlns:a16="http://schemas.microsoft.com/office/drawing/2014/main" id="{8768489C-D92F-4D01-BBEE-8FE07D7C541C}"/>
+              </a:ext>
+            </a:extLst>
+          </p:cNvPr>
+          <p:cNvGrpSpPr/>
+          <p:nvPr/>
+        </p:nvGrpSpPr>
+        <p:grpSpPr>
+          <a:xfrm>
+            <a:off x="4300443" y="4276745"/>
+            <a:ext cx="1611086" cy="1621189"/>
+            <a:chOff x="342900" y="4452257"/>
+            <a:chExt cx="1611086" cy="1621189"/>
+          </a:xfrm>
+        </p:grpSpPr>
+        <p:sp>
+          <p:nvSpPr>
+            <p:cNvPr id="7" name="화살표: 위쪽 6">
+              <a:extLst>
+                <a:ext uri="{FF2B5EF4-FFF2-40B4-BE49-F238E27FC236}">
+                  <a16:creationId xmlns:a16="http://schemas.microsoft.com/office/drawing/2014/main" id="{932522DB-75DB-4C35-95D9-E87615FDACEF}"/>
+                </a:ext>
+              </a:extLst>
+            </p:cNvPr>
+            <p:cNvSpPr/>
+            <p:nvPr/>
+          </p:nvSpPr>
+          <p:spPr>
+            <a:xfrm>
+              <a:off x="642257" y="4452257"/>
+              <a:ext cx="1012372" cy="1251857"/>
+            </a:xfrm>
+            <a:prstGeom prst="upArrow">
+              <a:avLst/>
+            </a:prstGeom>
+          </p:spPr>
+          <p:style>
+            <a:lnRef idx="2">
+              <a:schemeClr val="accent1">
+                <a:shade val="50000"/>
+              </a:schemeClr>
+            </a:lnRef>
+            <a:fillRef idx="1">
+              <a:schemeClr val="accent1"/>
+            </a:fillRef>
+            <a:effectRef idx="0">
+              <a:schemeClr val="accent1"/>
+            </a:effectRef>
+            <a:fontRef idx="minor">
+              <a:schemeClr val="lt1"/>
+            </a:fontRef>
+          </p:style>
+          <p:txBody>
+            <a:bodyPr rtlCol="0" anchor="ctr"/>
+            <a:lstStyle/>
+            <a:p>
+              <a:pPr algn="ctr"/>
+              <a:endParaRPr lang="ko-KR" altLang="en-US">
+                <a:latin typeface="a고딕12" panose="02020600000000000000" pitchFamily="18" charset="-127"/>
+                <a:ea typeface="a고딕12" panose="02020600000000000000" pitchFamily="18" charset="-127"/>
+              </a:endParaRPr>
+            </a:p>
+          </p:txBody>
+        </p:sp>
+        <p:sp>
+          <p:nvSpPr>
+            <p:cNvPr id="8" name="TextBox 7">
+              <a:extLst>
+                <a:ext uri="{FF2B5EF4-FFF2-40B4-BE49-F238E27FC236}">
+                  <a16:creationId xmlns:a16="http://schemas.microsoft.com/office/drawing/2014/main" id="{53831BCA-699D-4774-8AA2-7635412EF293}"/>
+                </a:ext>
+              </a:extLst>
+            </p:cNvPr>
+            <p:cNvSpPr txBox="1"/>
+            <p:nvPr/>
+          </p:nvSpPr>
+          <p:spPr>
+            <a:xfrm>
+              <a:off x="342900" y="5704114"/>
+              <a:ext cx="1611086" cy="369332"/>
+            </a:xfrm>
+            <a:prstGeom prst="rect">
+              <a:avLst/>
+            </a:prstGeom>
+            <a:noFill/>
+          </p:spPr>
+          <p:txBody>
+            <a:bodyPr wrap="square" rtlCol="0">
+              <a:spAutoFit/>
+            </a:bodyPr>
+            <a:lstStyle/>
+            <a:p>
+              <a:pPr algn="ctr"/>
+              <a:r>
+                <a:rPr lang="en-US" altLang="ko-KR" dirty="0">
+                  <a:latin typeface="a고딕12" panose="02020600000000000000" pitchFamily="18" charset="-127"/>
+                  <a:ea typeface="a고딕12" panose="02020600000000000000" pitchFamily="18" charset="-127"/>
+                </a:rPr>
+                <a:t>index</a:t>
+              </a:r>
+              <a:endParaRPr lang="ko-KR" altLang="en-US" dirty="0">
+                <a:latin typeface="a고딕12" panose="02020600000000000000" pitchFamily="18" charset="-127"/>
+                <a:ea typeface="a고딕12" panose="02020600000000000000" pitchFamily="18" charset="-127"/>
+              </a:endParaRPr>
+            </a:p>
+          </p:txBody>
+        </p:sp>
+      </p:grpSp>
+      <p:sp>
+        <p:nvSpPr>
+          <p:cNvPr id="10" name="TextBox 9">
+            <a:extLst>
+              <a:ext uri="{FF2B5EF4-FFF2-40B4-BE49-F238E27FC236}">
+                <a16:creationId xmlns:a16="http://schemas.microsoft.com/office/drawing/2014/main" id="{39D3F9AF-6F7C-45C1-A222-232611847B73}"/>
+              </a:ext>
+            </a:extLst>
+          </p:cNvPr>
+          <p:cNvSpPr txBox="1"/>
+          <p:nvPr/>
+        </p:nvSpPr>
+        <p:spPr>
+          <a:xfrm>
+            <a:off x="1012874" y="559136"/>
+            <a:ext cx="4740812" cy="707886"/>
+          </a:xfrm>
+          <a:prstGeom prst="rect">
+            <a:avLst/>
+          </a:prstGeom>
+          <a:noFill/>
+        </p:spPr>
+        <p:txBody>
+          <a:bodyPr wrap="square" rtlCol="0">
+            <a:spAutoFit/>
+          </a:bodyPr>
+          <a:lstStyle/>
+          <a:p>
+            <a:r>
+              <a:rPr lang="en-US" altLang="ko-KR" sz="4000" dirty="0">
+                <a:latin typeface="a고딕12" panose="02020600000000000000" pitchFamily="18" charset="-127"/>
+                <a:ea typeface="a고딕12" panose="02020600000000000000" pitchFamily="18" charset="-127"/>
+              </a:rPr>
+              <a:t>M = 3</a:t>
+            </a:r>
+            <a:endParaRPr lang="ko-KR" altLang="en-US" sz="4000" dirty="0">
+              <a:latin typeface="a고딕12" panose="02020600000000000000" pitchFamily="18" charset="-127"/>
+              <a:ea typeface="a고딕12" panose="02020600000000000000" pitchFamily="18" charset="-127"/>
+            </a:endParaRPr>
+          </a:p>
+        </p:txBody>
+      </p:sp>
+    </p:spTree>
+    <p:extLst>
+      <p:ext uri="{BB962C8B-B14F-4D97-AF65-F5344CB8AC3E}">
+        <p14:creationId xmlns:p14="http://schemas.microsoft.com/office/powerpoint/2010/main" val="409088182"/>
       </p:ext>
     </p:extLst>
   </p:cSld>

</xml_diff>